<commit_message>
Minor Updates in PPT
</commit_message>
<xml_diff>
--- a/Tech Spartans/Tech_Spartans.pptx
+++ b/Tech Spartans/Tech_Spartans.pptx
@@ -60,7 +60,7 @@
       </p:grpSpPr>
       <p:sp>
         <p:nvSpPr>
-          <p:cNvPr id="29" name="PlaceHolder 1"/>
+          <p:cNvPr id="26" name="PlaceHolder 1"/>
           <p:cNvSpPr>
             <a:spLocks noGrp="1"/>
           </p:cNvSpPr>
@@ -71,7 +71,7 @@
         <p:spPr>
           <a:xfrm>
             <a:off x="504000" y="226080"/>
-            <a:ext cx="9070920" cy="945720"/>
+            <a:ext cx="9070560" cy="945360"/>
           </a:xfrm>
           <a:prstGeom prst="rect">
             <a:avLst/>
@@ -82,18 +82,16 @@
             <a:noAutofit/>
           </a:bodyPr>
           <a:p>
-            <a:endParaRPr b="0" lang="en-US" sz="1800" spc="-1" strike="noStrike">
-              <a:solidFill>
-                <a:srgbClr val="000000"/>
-              </a:solidFill>
-              <a:latin typeface="Calibri"/>
-            </a:endParaRPr>
-          </a:p>
-        </p:txBody>
-      </p:sp>
-      <p:sp>
-        <p:nvSpPr>
-          <p:cNvPr id="30" name="PlaceHolder 2"/>
+            <a:pPr algn="ctr"/>
+            <a:endParaRPr b="0" lang="en-IN" sz="4400" spc="-1" strike="noStrike">
+              <a:latin typeface="Arial"/>
+            </a:endParaRPr>
+          </a:p>
+        </p:txBody>
+      </p:sp>
+      <p:sp>
+        <p:nvSpPr>
+          <p:cNvPr id="27" name="PlaceHolder 2"/>
           <p:cNvSpPr>
             <a:spLocks noGrp="1"/>
           </p:cNvSpPr>
@@ -104,7 +102,7 @@
         <p:spPr>
           <a:xfrm>
             <a:off x="504000" y="1326600"/>
-            <a:ext cx="9072000" cy="1568520"/>
+            <a:ext cx="9071640" cy="1568160"/>
           </a:xfrm>
           <a:prstGeom prst="rect">
             <a:avLst/>
@@ -115,18 +113,15 @@
             <a:normAutofit/>
           </a:bodyPr>
           <a:p>
-            <a:endParaRPr b="0" lang="en-US" sz="2000" spc="-1" strike="noStrike">
-              <a:solidFill>
-                <a:srgbClr val="404040"/>
-              </a:solidFill>
-              <a:latin typeface="Calibri"/>
-            </a:endParaRPr>
-          </a:p>
-        </p:txBody>
-      </p:sp>
-      <p:sp>
-        <p:nvSpPr>
-          <p:cNvPr id="31" name="PlaceHolder 3"/>
+            <a:endParaRPr b="0" lang="en-IN" sz="3200" spc="-1" strike="noStrike">
+              <a:latin typeface="Arial"/>
+            </a:endParaRPr>
+          </a:p>
+        </p:txBody>
+      </p:sp>
+      <p:sp>
+        <p:nvSpPr>
+          <p:cNvPr id="28" name="PlaceHolder 3"/>
           <p:cNvSpPr>
             <a:spLocks noGrp="1"/>
           </p:cNvSpPr>
@@ -136,8 +131,8 @@
         </p:nvSpPr>
         <p:spPr>
           <a:xfrm>
-            <a:off x="504000" y="3044520"/>
-            <a:ext cx="9072000" cy="1568520"/>
+            <a:off x="504000" y="3044160"/>
+            <a:ext cx="9071640" cy="1568160"/>
           </a:xfrm>
           <a:prstGeom prst="rect">
             <a:avLst/>
@@ -148,11 +143,8 @@
             <a:normAutofit/>
           </a:bodyPr>
           <a:p>
-            <a:endParaRPr b="0" lang="en-US" sz="2000" spc="-1" strike="noStrike">
-              <a:solidFill>
-                <a:srgbClr val="404040"/>
-              </a:solidFill>
-              <a:latin typeface="Calibri"/>
+            <a:endParaRPr b="0" lang="en-IN" sz="3200" spc="-1" strike="noStrike">
+              <a:latin typeface="Arial"/>
             </a:endParaRPr>
           </a:p>
         </p:txBody>
@@ -181,7 +173,7 @@
       </p:grpSpPr>
       <p:sp>
         <p:nvSpPr>
-          <p:cNvPr id="32" name="PlaceHolder 1"/>
+          <p:cNvPr id="29" name="PlaceHolder 1"/>
           <p:cNvSpPr>
             <a:spLocks noGrp="1"/>
           </p:cNvSpPr>
@@ -192,7 +184,7 @@
         <p:spPr>
           <a:xfrm>
             <a:off x="504000" y="226080"/>
-            <a:ext cx="9070920" cy="945720"/>
+            <a:ext cx="9070560" cy="945360"/>
           </a:xfrm>
           <a:prstGeom prst="rect">
             <a:avLst/>
@@ -203,18 +195,16 @@
             <a:noAutofit/>
           </a:bodyPr>
           <a:p>
-            <a:endParaRPr b="0" lang="en-US" sz="1800" spc="-1" strike="noStrike">
-              <a:solidFill>
-                <a:srgbClr val="000000"/>
-              </a:solidFill>
-              <a:latin typeface="Calibri"/>
-            </a:endParaRPr>
-          </a:p>
-        </p:txBody>
-      </p:sp>
-      <p:sp>
-        <p:nvSpPr>
-          <p:cNvPr id="33" name="PlaceHolder 2"/>
+            <a:pPr algn="ctr"/>
+            <a:endParaRPr b="0" lang="en-IN" sz="4400" spc="-1" strike="noStrike">
+              <a:latin typeface="Arial"/>
+            </a:endParaRPr>
+          </a:p>
+        </p:txBody>
+      </p:sp>
+      <p:sp>
+        <p:nvSpPr>
+          <p:cNvPr id="30" name="PlaceHolder 2"/>
           <p:cNvSpPr>
             <a:spLocks noGrp="1"/>
           </p:cNvSpPr>
@@ -225,7 +215,7 @@
         <p:spPr>
           <a:xfrm>
             <a:off x="504000" y="1326600"/>
-            <a:ext cx="4426920" cy="1568520"/>
+            <a:ext cx="4426920" cy="1568160"/>
           </a:xfrm>
           <a:prstGeom prst="rect">
             <a:avLst/>
@@ -236,18 +226,15 @@
             <a:normAutofit/>
           </a:bodyPr>
           <a:p>
-            <a:endParaRPr b="0" lang="en-US" sz="2000" spc="-1" strike="noStrike">
-              <a:solidFill>
-                <a:srgbClr val="404040"/>
-              </a:solidFill>
-              <a:latin typeface="Calibri"/>
-            </a:endParaRPr>
-          </a:p>
-        </p:txBody>
-      </p:sp>
-      <p:sp>
-        <p:nvSpPr>
-          <p:cNvPr id="34" name="PlaceHolder 3"/>
+            <a:endParaRPr b="0" lang="en-IN" sz="3200" spc="-1" strike="noStrike">
+              <a:latin typeface="Arial"/>
+            </a:endParaRPr>
+          </a:p>
+        </p:txBody>
+      </p:sp>
+      <p:sp>
+        <p:nvSpPr>
+          <p:cNvPr id="31" name="PlaceHolder 3"/>
           <p:cNvSpPr>
             <a:spLocks noGrp="1"/>
           </p:cNvSpPr>
@@ -258,7 +245,7 @@
         <p:spPr>
           <a:xfrm>
             <a:off x="5152680" y="1326600"/>
-            <a:ext cx="4426920" cy="1568520"/>
+            <a:ext cx="4426920" cy="1568160"/>
           </a:xfrm>
           <a:prstGeom prst="rect">
             <a:avLst/>
@@ -269,18 +256,15 @@
             <a:normAutofit/>
           </a:bodyPr>
           <a:p>
-            <a:endParaRPr b="0" lang="en-US" sz="2000" spc="-1" strike="noStrike">
-              <a:solidFill>
-                <a:srgbClr val="404040"/>
-              </a:solidFill>
-              <a:latin typeface="Calibri"/>
-            </a:endParaRPr>
-          </a:p>
-        </p:txBody>
-      </p:sp>
-      <p:sp>
-        <p:nvSpPr>
-          <p:cNvPr id="35" name="PlaceHolder 4"/>
+            <a:endParaRPr b="0" lang="en-IN" sz="3200" spc="-1" strike="noStrike">
+              <a:latin typeface="Arial"/>
+            </a:endParaRPr>
+          </a:p>
+        </p:txBody>
+      </p:sp>
+      <p:sp>
+        <p:nvSpPr>
+          <p:cNvPr id="32" name="PlaceHolder 4"/>
           <p:cNvSpPr>
             <a:spLocks noGrp="1"/>
           </p:cNvSpPr>
@@ -290,8 +274,8 @@
         </p:nvSpPr>
         <p:spPr>
           <a:xfrm>
-            <a:off x="504000" y="3044520"/>
-            <a:ext cx="4426920" cy="1568520"/>
+            <a:off x="504000" y="3044160"/>
+            <a:ext cx="4426920" cy="1568160"/>
           </a:xfrm>
           <a:prstGeom prst="rect">
             <a:avLst/>
@@ -302,18 +286,15 @@
             <a:normAutofit/>
           </a:bodyPr>
           <a:p>
-            <a:endParaRPr b="0" lang="en-US" sz="2000" spc="-1" strike="noStrike">
-              <a:solidFill>
-                <a:srgbClr val="404040"/>
-              </a:solidFill>
-              <a:latin typeface="Calibri"/>
-            </a:endParaRPr>
-          </a:p>
-        </p:txBody>
-      </p:sp>
-      <p:sp>
-        <p:nvSpPr>
-          <p:cNvPr id="36" name="PlaceHolder 5"/>
+            <a:endParaRPr b="0" lang="en-IN" sz="3200" spc="-1" strike="noStrike">
+              <a:latin typeface="Arial"/>
+            </a:endParaRPr>
+          </a:p>
+        </p:txBody>
+      </p:sp>
+      <p:sp>
+        <p:nvSpPr>
+          <p:cNvPr id="33" name="PlaceHolder 5"/>
           <p:cNvSpPr>
             <a:spLocks noGrp="1"/>
           </p:cNvSpPr>
@@ -323,8 +304,8 @@
         </p:nvSpPr>
         <p:spPr>
           <a:xfrm>
-            <a:off x="5152680" y="3044520"/>
-            <a:ext cx="4426920" cy="1568520"/>
+            <a:off x="5152680" y="3044160"/>
+            <a:ext cx="4426920" cy="1568160"/>
           </a:xfrm>
           <a:prstGeom prst="rect">
             <a:avLst/>
@@ -335,11 +316,8 @@
             <a:normAutofit/>
           </a:bodyPr>
           <a:p>
-            <a:endParaRPr b="0" lang="en-US" sz="2000" spc="-1" strike="noStrike">
-              <a:solidFill>
-                <a:srgbClr val="404040"/>
-              </a:solidFill>
-              <a:latin typeface="Calibri"/>
+            <a:endParaRPr b="0" lang="en-IN" sz="3200" spc="-1" strike="noStrike">
+              <a:latin typeface="Arial"/>
             </a:endParaRPr>
           </a:p>
         </p:txBody>
@@ -368,7 +346,7 @@
       </p:grpSpPr>
       <p:sp>
         <p:nvSpPr>
-          <p:cNvPr id="37" name="PlaceHolder 1"/>
+          <p:cNvPr id="34" name="PlaceHolder 1"/>
           <p:cNvSpPr>
             <a:spLocks noGrp="1"/>
           </p:cNvSpPr>
@@ -379,7 +357,7 @@
         <p:spPr>
           <a:xfrm>
             <a:off x="504000" y="226080"/>
-            <a:ext cx="9070920" cy="945720"/>
+            <a:ext cx="9070560" cy="945360"/>
           </a:xfrm>
           <a:prstGeom prst="rect">
             <a:avLst/>
@@ -390,18 +368,16 @@
             <a:noAutofit/>
           </a:bodyPr>
           <a:p>
-            <a:endParaRPr b="0" lang="en-US" sz="1800" spc="-1" strike="noStrike">
-              <a:solidFill>
-                <a:srgbClr val="000000"/>
-              </a:solidFill>
-              <a:latin typeface="Calibri"/>
-            </a:endParaRPr>
-          </a:p>
-        </p:txBody>
-      </p:sp>
-      <p:sp>
-        <p:nvSpPr>
-          <p:cNvPr id="38" name="PlaceHolder 2"/>
+            <a:pPr algn="ctr"/>
+            <a:endParaRPr b="0" lang="en-IN" sz="4400" spc="-1" strike="noStrike">
+              <a:latin typeface="Arial"/>
+            </a:endParaRPr>
+          </a:p>
+        </p:txBody>
+      </p:sp>
+      <p:sp>
+        <p:nvSpPr>
+          <p:cNvPr id="35" name="PlaceHolder 2"/>
           <p:cNvSpPr>
             <a:spLocks noGrp="1"/>
           </p:cNvSpPr>
@@ -412,7 +388,7 @@
         <p:spPr>
           <a:xfrm>
             <a:off x="504000" y="1326600"/>
-            <a:ext cx="2921040" cy="1568520"/>
+            <a:ext cx="2920680" cy="1568160"/>
           </a:xfrm>
           <a:prstGeom prst="rect">
             <a:avLst/>
@@ -423,18 +399,15 @@
             <a:normAutofit/>
           </a:bodyPr>
           <a:p>
-            <a:endParaRPr b="0" lang="en-US" sz="2000" spc="-1" strike="noStrike">
-              <a:solidFill>
-                <a:srgbClr val="404040"/>
-              </a:solidFill>
-              <a:latin typeface="Calibri"/>
-            </a:endParaRPr>
-          </a:p>
-        </p:txBody>
-      </p:sp>
-      <p:sp>
-        <p:nvSpPr>
-          <p:cNvPr id="39" name="PlaceHolder 3"/>
+            <a:endParaRPr b="0" lang="en-IN" sz="3200" spc="-1" strike="noStrike">
+              <a:latin typeface="Arial"/>
+            </a:endParaRPr>
+          </a:p>
+        </p:txBody>
+      </p:sp>
+      <p:sp>
+        <p:nvSpPr>
+          <p:cNvPr id="36" name="PlaceHolder 3"/>
           <p:cNvSpPr>
             <a:spLocks noGrp="1"/>
           </p:cNvSpPr>
@@ -444,8 +417,8 @@
         </p:nvSpPr>
         <p:spPr>
           <a:xfrm>
-            <a:off x="3571560" y="1326600"/>
-            <a:ext cx="2921040" cy="1568520"/>
+            <a:off x="3571200" y="1326600"/>
+            <a:ext cx="2920680" cy="1568160"/>
           </a:xfrm>
           <a:prstGeom prst="rect">
             <a:avLst/>
@@ -456,18 +429,15 @@
             <a:normAutofit/>
           </a:bodyPr>
           <a:p>
-            <a:endParaRPr b="0" lang="en-US" sz="2000" spc="-1" strike="noStrike">
-              <a:solidFill>
-                <a:srgbClr val="404040"/>
-              </a:solidFill>
-              <a:latin typeface="Calibri"/>
-            </a:endParaRPr>
-          </a:p>
-        </p:txBody>
-      </p:sp>
-      <p:sp>
-        <p:nvSpPr>
-          <p:cNvPr id="40" name="PlaceHolder 4"/>
+            <a:endParaRPr b="0" lang="en-IN" sz="3200" spc="-1" strike="noStrike">
+              <a:latin typeface="Arial"/>
+            </a:endParaRPr>
+          </a:p>
+        </p:txBody>
+      </p:sp>
+      <p:sp>
+        <p:nvSpPr>
+          <p:cNvPr id="37" name="PlaceHolder 4"/>
           <p:cNvSpPr>
             <a:spLocks noGrp="1"/>
           </p:cNvSpPr>
@@ -477,8 +447,8 @@
         </p:nvSpPr>
         <p:spPr>
           <a:xfrm>
-            <a:off x="6639120" y="1326600"/>
-            <a:ext cx="2921040" cy="1568520"/>
+            <a:off x="6638040" y="1326600"/>
+            <a:ext cx="2920680" cy="1568160"/>
           </a:xfrm>
           <a:prstGeom prst="rect">
             <a:avLst/>
@@ -489,18 +459,15 @@
             <a:normAutofit/>
           </a:bodyPr>
           <a:p>
-            <a:endParaRPr b="0" lang="en-US" sz="2000" spc="-1" strike="noStrike">
-              <a:solidFill>
-                <a:srgbClr val="404040"/>
-              </a:solidFill>
-              <a:latin typeface="Calibri"/>
-            </a:endParaRPr>
-          </a:p>
-        </p:txBody>
-      </p:sp>
-      <p:sp>
-        <p:nvSpPr>
-          <p:cNvPr id="41" name="PlaceHolder 5"/>
+            <a:endParaRPr b="0" lang="en-IN" sz="3200" spc="-1" strike="noStrike">
+              <a:latin typeface="Arial"/>
+            </a:endParaRPr>
+          </a:p>
+        </p:txBody>
+      </p:sp>
+      <p:sp>
+        <p:nvSpPr>
+          <p:cNvPr id="38" name="PlaceHolder 5"/>
           <p:cNvSpPr>
             <a:spLocks noGrp="1"/>
           </p:cNvSpPr>
@@ -510,8 +477,8 @@
         </p:nvSpPr>
         <p:spPr>
           <a:xfrm>
-            <a:off x="504000" y="3044520"/>
-            <a:ext cx="2921040" cy="1568520"/>
+            <a:off x="504000" y="3044160"/>
+            <a:ext cx="2920680" cy="1568160"/>
           </a:xfrm>
           <a:prstGeom prst="rect">
             <a:avLst/>
@@ -522,18 +489,15 @@
             <a:normAutofit/>
           </a:bodyPr>
           <a:p>
-            <a:endParaRPr b="0" lang="en-US" sz="2000" spc="-1" strike="noStrike">
-              <a:solidFill>
-                <a:srgbClr val="404040"/>
-              </a:solidFill>
-              <a:latin typeface="Calibri"/>
-            </a:endParaRPr>
-          </a:p>
-        </p:txBody>
-      </p:sp>
-      <p:sp>
-        <p:nvSpPr>
-          <p:cNvPr id="42" name="PlaceHolder 6"/>
+            <a:endParaRPr b="0" lang="en-IN" sz="3200" spc="-1" strike="noStrike">
+              <a:latin typeface="Arial"/>
+            </a:endParaRPr>
+          </a:p>
+        </p:txBody>
+      </p:sp>
+      <p:sp>
+        <p:nvSpPr>
+          <p:cNvPr id="39" name="PlaceHolder 6"/>
           <p:cNvSpPr>
             <a:spLocks noGrp="1"/>
           </p:cNvSpPr>
@@ -543,8 +507,8 @@
         </p:nvSpPr>
         <p:spPr>
           <a:xfrm>
-            <a:off x="3571560" y="3044520"/>
-            <a:ext cx="2921040" cy="1568520"/>
+            <a:off x="3571200" y="3044160"/>
+            <a:ext cx="2920680" cy="1568160"/>
           </a:xfrm>
           <a:prstGeom prst="rect">
             <a:avLst/>
@@ -555,18 +519,15 @@
             <a:normAutofit/>
           </a:bodyPr>
           <a:p>
-            <a:endParaRPr b="0" lang="en-US" sz="2000" spc="-1" strike="noStrike">
-              <a:solidFill>
-                <a:srgbClr val="404040"/>
-              </a:solidFill>
-              <a:latin typeface="Calibri"/>
-            </a:endParaRPr>
-          </a:p>
-        </p:txBody>
-      </p:sp>
-      <p:sp>
-        <p:nvSpPr>
-          <p:cNvPr id="43" name="PlaceHolder 7"/>
+            <a:endParaRPr b="0" lang="en-IN" sz="3200" spc="-1" strike="noStrike">
+              <a:latin typeface="Arial"/>
+            </a:endParaRPr>
+          </a:p>
+        </p:txBody>
+      </p:sp>
+      <p:sp>
+        <p:nvSpPr>
+          <p:cNvPr id="40" name="PlaceHolder 7"/>
           <p:cNvSpPr>
             <a:spLocks noGrp="1"/>
           </p:cNvSpPr>
@@ -576,8 +537,8 @@
         </p:nvSpPr>
         <p:spPr>
           <a:xfrm>
-            <a:off x="6639120" y="3044520"/>
-            <a:ext cx="2921040" cy="1568520"/>
+            <a:off x="6638040" y="3044160"/>
+            <a:ext cx="2920680" cy="1568160"/>
           </a:xfrm>
           <a:prstGeom prst="rect">
             <a:avLst/>
@@ -588,11 +549,8 @@
             <a:normAutofit/>
           </a:bodyPr>
           <a:p>
-            <a:endParaRPr b="0" lang="en-US" sz="2000" spc="-1" strike="noStrike">
-              <a:solidFill>
-                <a:srgbClr val="404040"/>
-              </a:solidFill>
-              <a:latin typeface="Calibri"/>
+            <a:endParaRPr b="0" lang="en-IN" sz="3200" spc="-1" strike="noStrike">
+              <a:latin typeface="Arial"/>
             </a:endParaRPr>
           </a:p>
         </p:txBody>
@@ -643,7 +601,7 @@
       </p:grpSpPr>
       <p:sp>
         <p:nvSpPr>
-          <p:cNvPr id="49" name="PlaceHolder 1"/>
+          <p:cNvPr id="46" name="PlaceHolder 1"/>
           <p:cNvSpPr>
             <a:spLocks noGrp="1"/>
           </p:cNvSpPr>
@@ -654,7 +612,7 @@
         <p:spPr>
           <a:xfrm>
             <a:off x="504000" y="226080"/>
-            <a:ext cx="9070920" cy="945720"/>
+            <a:ext cx="9070560" cy="945360"/>
           </a:xfrm>
           <a:prstGeom prst="rect">
             <a:avLst/>
@@ -665,18 +623,16 @@
             <a:noAutofit/>
           </a:bodyPr>
           <a:p>
-            <a:endParaRPr b="0" lang="en-US" sz="1800" spc="-1" strike="noStrike">
-              <a:solidFill>
-                <a:srgbClr val="000000"/>
-              </a:solidFill>
-              <a:latin typeface="Calibri"/>
-            </a:endParaRPr>
-          </a:p>
-        </p:txBody>
-      </p:sp>
-      <p:sp>
-        <p:nvSpPr>
-          <p:cNvPr id="50" name="PlaceHolder 2"/>
+            <a:pPr algn="ctr"/>
+            <a:endParaRPr b="0" lang="en-IN" sz="4400" spc="-1" strike="noStrike">
+              <a:latin typeface="Arial"/>
+            </a:endParaRPr>
+          </a:p>
+        </p:txBody>
+      </p:sp>
+      <p:sp>
+        <p:nvSpPr>
+          <p:cNvPr id="47" name="PlaceHolder 2"/>
           <p:cNvSpPr>
             <a:spLocks noGrp="1"/>
           </p:cNvSpPr>
@@ -687,7 +643,7 @@
         <p:spPr>
           <a:xfrm>
             <a:off x="504000" y="1326600"/>
-            <a:ext cx="9072000" cy="3288600"/>
+            <a:ext cx="9071640" cy="3288240"/>
           </a:xfrm>
           <a:prstGeom prst="rect">
             <a:avLst/>
@@ -729,7 +685,7 @@
       </p:grpSpPr>
       <p:sp>
         <p:nvSpPr>
-          <p:cNvPr id="51" name="PlaceHolder 1"/>
+          <p:cNvPr id="48" name="PlaceHolder 1"/>
           <p:cNvSpPr>
             <a:spLocks noGrp="1"/>
           </p:cNvSpPr>
@@ -740,7 +696,7 @@
         <p:spPr>
           <a:xfrm>
             <a:off x="504000" y="226080"/>
-            <a:ext cx="9070920" cy="945720"/>
+            <a:ext cx="9070560" cy="945360"/>
           </a:xfrm>
           <a:prstGeom prst="rect">
             <a:avLst/>
@@ -751,18 +707,16 @@
             <a:noAutofit/>
           </a:bodyPr>
           <a:p>
-            <a:endParaRPr b="0" lang="en-US" sz="1800" spc="-1" strike="noStrike">
-              <a:solidFill>
-                <a:srgbClr val="000000"/>
-              </a:solidFill>
-              <a:latin typeface="Calibri"/>
-            </a:endParaRPr>
-          </a:p>
-        </p:txBody>
-      </p:sp>
-      <p:sp>
-        <p:nvSpPr>
-          <p:cNvPr id="52" name="PlaceHolder 2"/>
+            <a:pPr algn="ctr"/>
+            <a:endParaRPr b="0" lang="en-IN" sz="4400" spc="-1" strike="noStrike">
+              <a:latin typeface="Arial"/>
+            </a:endParaRPr>
+          </a:p>
+        </p:txBody>
+      </p:sp>
+      <p:sp>
+        <p:nvSpPr>
+          <p:cNvPr id="49" name="PlaceHolder 2"/>
           <p:cNvSpPr>
             <a:spLocks noGrp="1"/>
           </p:cNvSpPr>
@@ -773,7 +727,7 @@
         <p:spPr>
           <a:xfrm>
             <a:off x="504000" y="1326600"/>
-            <a:ext cx="9072000" cy="3288600"/>
+            <a:ext cx="9071640" cy="3288240"/>
           </a:xfrm>
           <a:prstGeom prst="rect">
             <a:avLst/>
@@ -784,11 +738,8 @@
             <a:normAutofit/>
           </a:bodyPr>
           <a:p>
-            <a:endParaRPr b="0" lang="en-US" sz="2000" spc="-1" strike="noStrike">
-              <a:solidFill>
-                <a:srgbClr val="404040"/>
-              </a:solidFill>
-              <a:latin typeface="Calibri"/>
+            <a:endParaRPr b="0" lang="en-IN" sz="3200" spc="-1" strike="noStrike">
+              <a:latin typeface="Arial"/>
             </a:endParaRPr>
           </a:p>
         </p:txBody>
@@ -817,7 +768,7 @@
       </p:grpSpPr>
       <p:sp>
         <p:nvSpPr>
-          <p:cNvPr id="53" name="PlaceHolder 1"/>
+          <p:cNvPr id="50" name="PlaceHolder 1"/>
           <p:cNvSpPr>
             <a:spLocks noGrp="1"/>
           </p:cNvSpPr>
@@ -828,7 +779,7 @@
         <p:spPr>
           <a:xfrm>
             <a:off x="504000" y="226080"/>
-            <a:ext cx="9070920" cy="945720"/>
+            <a:ext cx="9070560" cy="945360"/>
           </a:xfrm>
           <a:prstGeom prst="rect">
             <a:avLst/>
@@ -839,18 +790,16 @@
             <a:noAutofit/>
           </a:bodyPr>
           <a:p>
-            <a:endParaRPr b="0" lang="en-US" sz="1800" spc="-1" strike="noStrike">
-              <a:solidFill>
-                <a:srgbClr val="000000"/>
-              </a:solidFill>
-              <a:latin typeface="Calibri"/>
-            </a:endParaRPr>
-          </a:p>
-        </p:txBody>
-      </p:sp>
-      <p:sp>
-        <p:nvSpPr>
-          <p:cNvPr id="54" name="PlaceHolder 2"/>
+            <a:pPr algn="ctr"/>
+            <a:endParaRPr b="0" lang="en-IN" sz="4400" spc="-1" strike="noStrike">
+              <a:latin typeface="Arial"/>
+            </a:endParaRPr>
+          </a:p>
+        </p:txBody>
+      </p:sp>
+      <p:sp>
+        <p:nvSpPr>
+          <p:cNvPr id="51" name="PlaceHolder 2"/>
           <p:cNvSpPr>
             <a:spLocks noGrp="1"/>
           </p:cNvSpPr>
@@ -861,7 +810,7 @@
         <p:spPr>
           <a:xfrm>
             <a:off x="504000" y="1326600"/>
-            <a:ext cx="4426920" cy="3288600"/>
+            <a:ext cx="4426920" cy="3288240"/>
           </a:xfrm>
           <a:prstGeom prst="rect">
             <a:avLst/>
@@ -872,18 +821,15 @@
             <a:normAutofit/>
           </a:bodyPr>
           <a:p>
-            <a:endParaRPr b="0" lang="en-US" sz="2000" spc="-1" strike="noStrike">
-              <a:solidFill>
-                <a:srgbClr val="404040"/>
-              </a:solidFill>
-              <a:latin typeface="Calibri"/>
-            </a:endParaRPr>
-          </a:p>
-        </p:txBody>
-      </p:sp>
-      <p:sp>
-        <p:nvSpPr>
-          <p:cNvPr id="55" name="PlaceHolder 3"/>
+            <a:endParaRPr b="0" lang="en-IN" sz="3200" spc="-1" strike="noStrike">
+              <a:latin typeface="Arial"/>
+            </a:endParaRPr>
+          </a:p>
+        </p:txBody>
+      </p:sp>
+      <p:sp>
+        <p:nvSpPr>
+          <p:cNvPr id="52" name="PlaceHolder 3"/>
           <p:cNvSpPr>
             <a:spLocks noGrp="1"/>
           </p:cNvSpPr>
@@ -894,7 +840,7 @@
         <p:spPr>
           <a:xfrm>
             <a:off x="5152680" y="1326600"/>
-            <a:ext cx="4426920" cy="3288600"/>
+            <a:ext cx="4426920" cy="3288240"/>
           </a:xfrm>
           <a:prstGeom prst="rect">
             <a:avLst/>
@@ -905,11 +851,8 @@
             <a:normAutofit/>
           </a:bodyPr>
           <a:p>
-            <a:endParaRPr b="0" lang="en-US" sz="2000" spc="-1" strike="noStrike">
-              <a:solidFill>
-                <a:srgbClr val="404040"/>
-              </a:solidFill>
-              <a:latin typeface="Calibri"/>
+            <a:endParaRPr b="0" lang="en-IN" sz="3200" spc="-1" strike="noStrike">
+              <a:latin typeface="Arial"/>
             </a:endParaRPr>
           </a:p>
         </p:txBody>
@@ -938,7 +881,7 @@
       </p:grpSpPr>
       <p:sp>
         <p:nvSpPr>
-          <p:cNvPr id="56" name="PlaceHolder 1"/>
+          <p:cNvPr id="53" name="PlaceHolder 1"/>
           <p:cNvSpPr>
             <a:spLocks noGrp="1"/>
           </p:cNvSpPr>
@@ -949,7 +892,7 @@
         <p:spPr>
           <a:xfrm>
             <a:off x="504000" y="226080"/>
-            <a:ext cx="9070920" cy="945720"/>
+            <a:ext cx="9070560" cy="945360"/>
           </a:xfrm>
           <a:prstGeom prst="rect">
             <a:avLst/>
@@ -960,11 +903,9 @@
             <a:noAutofit/>
           </a:bodyPr>
           <a:p>
-            <a:endParaRPr b="0" lang="en-US" sz="1800" spc="-1" strike="noStrike">
-              <a:solidFill>
-                <a:srgbClr val="000000"/>
-              </a:solidFill>
-              <a:latin typeface="Calibri"/>
+            <a:pPr algn="ctr"/>
+            <a:endParaRPr b="0" lang="en-IN" sz="4400" spc="-1" strike="noStrike">
+              <a:latin typeface="Arial"/>
             </a:endParaRPr>
           </a:p>
         </p:txBody>
@@ -993,7 +934,7 @@
       </p:grpSpPr>
       <p:sp>
         <p:nvSpPr>
-          <p:cNvPr id="57" name="PlaceHolder 1"/>
+          <p:cNvPr id="54" name="PlaceHolder 1"/>
           <p:cNvSpPr>
             <a:spLocks noGrp="1"/>
           </p:cNvSpPr>
@@ -1004,7 +945,7 @@
         <p:spPr>
           <a:xfrm>
             <a:off x="504000" y="226080"/>
-            <a:ext cx="9070920" cy="4385160"/>
+            <a:ext cx="9070560" cy="4383360"/>
           </a:xfrm>
           <a:prstGeom prst="rect">
             <a:avLst/>
@@ -1046,7 +987,7 @@
       </p:grpSpPr>
       <p:sp>
         <p:nvSpPr>
-          <p:cNvPr id="58" name="PlaceHolder 1"/>
+          <p:cNvPr id="55" name="PlaceHolder 1"/>
           <p:cNvSpPr>
             <a:spLocks noGrp="1"/>
           </p:cNvSpPr>
@@ -1057,7 +998,7 @@
         <p:spPr>
           <a:xfrm>
             <a:off x="504000" y="226080"/>
-            <a:ext cx="9070920" cy="945720"/>
+            <a:ext cx="9070560" cy="945360"/>
           </a:xfrm>
           <a:prstGeom prst="rect">
             <a:avLst/>
@@ -1068,18 +1009,16 @@
             <a:noAutofit/>
           </a:bodyPr>
           <a:p>
-            <a:endParaRPr b="0" lang="en-US" sz="1800" spc="-1" strike="noStrike">
-              <a:solidFill>
-                <a:srgbClr val="000000"/>
-              </a:solidFill>
-              <a:latin typeface="Calibri"/>
-            </a:endParaRPr>
-          </a:p>
-        </p:txBody>
-      </p:sp>
-      <p:sp>
-        <p:nvSpPr>
-          <p:cNvPr id="59" name="PlaceHolder 2"/>
+            <a:pPr algn="ctr"/>
+            <a:endParaRPr b="0" lang="en-IN" sz="4400" spc="-1" strike="noStrike">
+              <a:latin typeface="Arial"/>
+            </a:endParaRPr>
+          </a:p>
+        </p:txBody>
+      </p:sp>
+      <p:sp>
+        <p:nvSpPr>
+          <p:cNvPr id="56" name="PlaceHolder 2"/>
           <p:cNvSpPr>
             <a:spLocks noGrp="1"/>
           </p:cNvSpPr>
@@ -1090,7 +1029,7 @@
         <p:spPr>
           <a:xfrm>
             <a:off x="504000" y="1326600"/>
-            <a:ext cx="4426920" cy="1568520"/>
+            <a:ext cx="4426920" cy="1568160"/>
           </a:xfrm>
           <a:prstGeom prst="rect">
             <a:avLst/>
@@ -1101,18 +1040,15 @@
             <a:normAutofit/>
           </a:bodyPr>
           <a:p>
-            <a:endParaRPr b="0" lang="en-US" sz="2000" spc="-1" strike="noStrike">
-              <a:solidFill>
-                <a:srgbClr val="404040"/>
-              </a:solidFill>
-              <a:latin typeface="Calibri"/>
-            </a:endParaRPr>
-          </a:p>
-        </p:txBody>
-      </p:sp>
-      <p:sp>
-        <p:nvSpPr>
-          <p:cNvPr id="60" name="PlaceHolder 3"/>
+            <a:endParaRPr b="0" lang="en-IN" sz="3200" spc="-1" strike="noStrike">
+              <a:latin typeface="Arial"/>
+            </a:endParaRPr>
+          </a:p>
+        </p:txBody>
+      </p:sp>
+      <p:sp>
+        <p:nvSpPr>
+          <p:cNvPr id="57" name="PlaceHolder 3"/>
           <p:cNvSpPr>
             <a:spLocks noGrp="1"/>
           </p:cNvSpPr>
@@ -1123,7 +1059,7 @@
         <p:spPr>
           <a:xfrm>
             <a:off x="5152680" y="1326600"/>
-            <a:ext cx="4426920" cy="3288600"/>
+            <a:ext cx="4426920" cy="3288240"/>
           </a:xfrm>
           <a:prstGeom prst="rect">
             <a:avLst/>
@@ -1134,18 +1070,15 @@
             <a:normAutofit/>
           </a:bodyPr>
           <a:p>
-            <a:endParaRPr b="0" lang="en-US" sz="2000" spc="-1" strike="noStrike">
-              <a:solidFill>
-                <a:srgbClr val="404040"/>
-              </a:solidFill>
-              <a:latin typeface="Calibri"/>
-            </a:endParaRPr>
-          </a:p>
-        </p:txBody>
-      </p:sp>
-      <p:sp>
-        <p:nvSpPr>
-          <p:cNvPr id="61" name="PlaceHolder 4"/>
+            <a:endParaRPr b="0" lang="en-IN" sz="3200" spc="-1" strike="noStrike">
+              <a:latin typeface="Arial"/>
+            </a:endParaRPr>
+          </a:p>
+        </p:txBody>
+      </p:sp>
+      <p:sp>
+        <p:nvSpPr>
+          <p:cNvPr id="58" name="PlaceHolder 4"/>
           <p:cNvSpPr>
             <a:spLocks noGrp="1"/>
           </p:cNvSpPr>
@@ -1155,8 +1088,8 @@
         </p:nvSpPr>
         <p:spPr>
           <a:xfrm>
-            <a:off x="504000" y="3044520"/>
-            <a:ext cx="4426920" cy="1568520"/>
+            <a:off x="504000" y="3044160"/>
+            <a:ext cx="4426920" cy="1568160"/>
           </a:xfrm>
           <a:prstGeom prst="rect">
             <a:avLst/>
@@ -1167,11 +1100,8 @@
             <a:normAutofit/>
           </a:bodyPr>
           <a:p>
-            <a:endParaRPr b="0" lang="en-US" sz="2000" spc="-1" strike="noStrike">
-              <a:solidFill>
-                <a:srgbClr val="404040"/>
-              </a:solidFill>
-              <a:latin typeface="Calibri"/>
+            <a:endParaRPr b="0" lang="en-IN" sz="3200" spc="-1" strike="noStrike">
+              <a:latin typeface="Arial"/>
             </a:endParaRPr>
           </a:p>
         </p:txBody>
@@ -1200,7 +1130,7 @@
       </p:grpSpPr>
       <p:sp>
         <p:nvSpPr>
-          <p:cNvPr id="8" name="PlaceHolder 1"/>
+          <p:cNvPr id="5" name="PlaceHolder 1"/>
           <p:cNvSpPr>
             <a:spLocks noGrp="1"/>
           </p:cNvSpPr>
@@ -1211,7 +1141,7 @@
         <p:spPr>
           <a:xfrm>
             <a:off x="504000" y="226080"/>
-            <a:ext cx="9070920" cy="945720"/>
+            <a:ext cx="9070560" cy="945360"/>
           </a:xfrm>
           <a:prstGeom prst="rect">
             <a:avLst/>
@@ -1222,18 +1152,16 @@
             <a:noAutofit/>
           </a:bodyPr>
           <a:p>
-            <a:endParaRPr b="0" lang="en-US" sz="1800" spc="-1" strike="noStrike">
-              <a:solidFill>
-                <a:srgbClr val="000000"/>
-              </a:solidFill>
-              <a:latin typeface="Calibri"/>
-            </a:endParaRPr>
-          </a:p>
-        </p:txBody>
-      </p:sp>
-      <p:sp>
-        <p:nvSpPr>
-          <p:cNvPr id="9" name="PlaceHolder 2"/>
+            <a:pPr algn="ctr"/>
+            <a:endParaRPr b="0" lang="en-IN" sz="4400" spc="-1" strike="noStrike">
+              <a:latin typeface="Arial"/>
+            </a:endParaRPr>
+          </a:p>
+        </p:txBody>
+      </p:sp>
+      <p:sp>
+        <p:nvSpPr>
+          <p:cNvPr id="6" name="PlaceHolder 2"/>
           <p:cNvSpPr>
             <a:spLocks noGrp="1"/>
           </p:cNvSpPr>
@@ -1244,7 +1172,7 @@
         <p:spPr>
           <a:xfrm>
             <a:off x="504000" y="1326600"/>
-            <a:ext cx="9072000" cy="3288600"/>
+            <a:ext cx="9071640" cy="3288240"/>
           </a:xfrm>
           <a:prstGeom prst="rect">
             <a:avLst/>
@@ -1286,7 +1214,7 @@
       </p:grpSpPr>
       <p:sp>
         <p:nvSpPr>
-          <p:cNvPr id="62" name="PlaceHolder 1"/>
+          <p:cNvPr id="59" name="PlaceHolder 1"/>
           <p:cNvSpPr>
             <a:spLocks noGrp="1"/>
           </p:cNvSpPr>
@@ -1297,7 +1225,7 @@
         <p:spPr>
           <a:xfrm>
             <a:off x="504000" y="226080"/>
-            <a:ext cx="9070920" cy="945720"/>
+            <a:ext cx="9070560" cy="945360"/>
           </a:xfrm>
           <a:prstGeom prst="rect">
             <a:avLst/>
@@ -1308,18 +1236,16 @@
             <a:noAutofit/>
           </a:bodyPr>
           <a:p>
-            <a:endParaRPr b="0" lang="en-US" sz="1800" spc="-1" strike="noStrike">
-              <a:solidFill>
-                <a:srgbClr val="000000"/>
-              </a:solidFill>
-              <a:latin typeface="Calibri"/>
-            </a:endParaRPr>
-          </a:p>
-        </p:txBody>
-      </p:sp>
-      <p:sp>
-        <p:nvSpPr>
-          <p:cNvPr id="63" name="PlaceHolder 2"/>
+            <a:pPr algn="ctr"/>
+            <a:endParaRPr b="0" lang="en-IN" sz="4400" spc="-1" strike="noStrike">
+              <a:latin typeface="Arial"/>
+            </a:endParaRPr>
+          </a:p>
+        </p:txBody>
+      </p:sp>
+      <p:sp>
+        <p:nvSpPr>
+          <p:cNvPr id="60" name="PlaceHolder 2"/>
           <p:cNvSpPr>
             <a:spLocks noGrp="1"/>
           </p:cNvSpPr>
@@ -1330,7 +1256,7 @@
         <p:spPr>
           <a:xfrm>
             <a:off x="504000" y="1326600"/>
-            <a:ext cx="4426920" cy="3288600"/>
+            <a:ext cx="4426920" cy="3288240"/>
           </a:xfrm>
           <a:prstGeom prst="rect">
             <a:avLst/>
@@ -1341,18 +1267,15 @@
             <a:normAutofit/>
           </a:bodyPr>
           <a:p>
-            <a:endParaRPr b="0" lang="en-US" sz="2000" spc="-1" strike="noStrike">
-              <a:solidFill>
-                <a:srgbClr val="404040"/>
-              </a:solidFill>
-              <a:latin typeface="Calibri"/>
-            </a:endParaRPr>
-          </a:p>
-        </p:txBody>
-      </p:sp>
-      <p:sp>
-        <p:nvSpPr>
-          <p:cNvPr id="64" name="PlaceHolder 3"/>
+            <a:endParaRPr b="0" lang="en-IN" sz="3200" spc="-1" strike="noStrike">
+              <a:latin typeface="Arial"/>
+            </a:endParaRPr>
+          </a:p>
+        </p:txBody>
+      </p:sp>
+      <p:sp>
+        <p:nvSpPr>
+          <p:cNvPr id="61" name="PlaceHolder 3"/>
           <p:cNvSpPr>
             <a:spLocks noGrp="1"/>
           </p:cNvSpPr>
@@ -1363,7 +1286,7 @@
         <p:spPr>
           <a:xfrm>
             <a:off x="5152680" y="1326600"/>
-            <a:ext cx="4426920" cy="1568520"/>
+            <a:ext cx="4426920" cy="1568160"/>
           </a:xfrm>
           <a:prstGeom prst="rect">
             <a:avLst/>
@@ -1374,18 +1297,15 @@
             <a:normAutofit/>
           </a:bodyPr>
           <a:p>
-            <a:endParaRPr b="0" lang="en-US" sz="2000" spc="-1" strike="noStrike">
-              <a:solidFill>
-                <a:srgbClr val="404040"/>
-              </a:solidFill>
-              <a:latin typeface="Calibri"/>
-            </a:endParaRPr>
-          </a:p>
-        </p:txBody>
-      </p:sp>
-      <p:sp>
-        <p:nvSpPr>
-          <p:cNvPr id="65" name="PlaceHolder 4"/>
+            <a:endParaRPr b="0" lang="en-IN" sz="3200" spc="-1" strike="noStrike">
+              <a:latin typeface="Arial"/>
+            </a:endParaRPr>
+          </a:p>
+        </p:txBody>
+      </p:sp>
+      <p:sp>
+        <p:nvSpPr>
+          <p:cNvPr id="62" name="PlaceHolder 4"/>
           <p:cNvSpPr>
             <a:spLocks noGrp="1"/>
           </p:cNvSpPr>
@@ -1395,8 +1315,8 @@
         </p:nvSpPr>
         <p:spPr>
           <a:xfrm>
-            <a:off x="5152680" y="3044520"/>
-            <a:ext cx="4426920" cy="1568520"/>
+            <a:off x="5152680" y="3044160"/>
+            <a:ext cx="4426920" cy="1568160"/>
           </a:xfrm>
           <a:prstGeom prst="rect">
             <a:avLst/>
@@ -1407,11 +1327,8 @@
             <a:normAutofit/>
           </a:bodyPr>
           <a:p>
-            <a:endParaRPr b="0" lang="en-US" sz="2000" spc="-1" strike="noStrike">
-              <a:solidFill>
-                <a:srgbClr val="404040"/>
-              </a:solidFill>
-              <a:latin typeface="Calibri"/>
+            <a:endParaRPr b="0" lang="en-IN" sz="3200" spc="-1" strike="noStrike">
+              <a:latin typeface="Arial"/>
             </a:endParaRPr>
           </a:p>
         </p:txBody>
@@ -1440,7 +1357,7 @@
       </p:grpSpPr>
       <p:sp>
         <p:nvSpPr>
-          <p:cNvPr id="66" name="PlaceHolder 1"/>
+          <p:cNvPr id="63" name="PlaceHolder 1"/>
           <p:cNvSpPr>
             <a:spLocks noGrp="1"/>
           </p:cNvSpPr>
@@ -1451,7 +1368,7 @@
         <p:spPr>
           <a:xfrm>
             <a:off x="504000" y="226080"/>
-            <a:ext cx="9070920" cy="945720"/>
+            <a:ext cx="9070560" cy="945360"/>
           </a:xfrm>
           <a:prstGeom prst="rect">
             <a:avLst/>
@@ -1462,18 +1379,16 @@
             <a:noAutofit/>
           </a:bodyPr>
           <a:p>
-            <a:endParaRPr b="0" lang="en-US" sz="1800" spc="-1" strike="noStrike">
-              <a:solidFill>
-                <a:srgbClr val="000000"/>
-              </a:solidFill>
-              <a:latin typeface="Calibri"/>
-            </a:endParaRPr>
-          </a:p>
-        </p:txBody>
-      </p:sp>
-      <p:sp>
-        <p:nvSpPr>
-          <p:cNvPr id="67" name="PlaceHolder 2"/>
+            <a:pPr algn="ctr"/>
+            <a:endParaRPr b="0" lang="en-IN" sz="4400" spc="-1" strike="noStrike">
+              <a:latin typeface="Arial"/>
+            </a:endParaRPr>
+          </a:p>
+        </p:txBody>
+      </p:sp>
+      <p:sp>
+        <p:nvSpPr>
+          <p:cNvPr id="64" name="PlaceHolder 2"/>
           <p:cNvSpPr>
             <a:spLocks noGrp="1"/>
           </p:cNvSpPr>
@@ -1484,7 +1399,7 @@
         <p:spPr>
           <a:xfrm>
             <a:off x="504000" y="1326600"/>
-            <a:ext cx="4426920" cy="1568520"/>
+            <a:ext cx="4426920" cy="1568160"/>
           </a:xfrm>
           <a:prstGeom prst="rect">
             <a:avLst/>
@@ -1495,18 +1410,15 @@
             <a:normAutofit/>
           </a:bodyPr>
           <a:p>
-            <a:endParaRPr b="0" lang="en-US" sz="2000" spc="-1" strike="noStrike">
-              <a:solidFill>
-                <a:srgbClr val="404040"/>
-              </a:solidFill>
-              <a:latin typeface="Calibri"/>
-            </a:endParaRPr>
-          </a:p>
-        </p:txBody>
-      </p:sp>
-      <p:sp>
-        <p:nvSpPr>
-          <p:cNvPr id="68" name="PlaceHolder 3"/>
+            <a:endParaRPr b="0" lang="en-IN" sz="3200" spc="-1" strike="noStrike">
+              <a:latin typeface="Arial"/>
+            </a:endParaRPr>
+          </a:p>
+        </p:txBody>
+      </p:sp>
+      <p:sp>
+        <p:nvSpPr>
+          <p:cNvPr id="65" name="PlaceHolder 3"/>
           <p:cNvSpPr>
             <a:spLocks noGrp="1"/>
           </p:cNvSpPr>
@@ -1517,7 +1429,7 @@
         <p:spPr>
           <a:xfrm>
             <a:off x="5152680" y="1326600"/>
-            <a:ext cx="4426920" cy="1568520"/>
+            <a:ext cx="4426920" cy="1568160"/>
           </a:xfrm>
           <a:prstGeom prst="rect">
             <a:avLst/>
@@ -1528,18 +1440,15 @@
             <a:normAutofit/>
           </a:bodyPr>
           <a:p>
-            <a:endParaRPr b="0" lang="en-US" sz="2000" spc="-1" strike="noStrike">
-              <a:solidFill>
-                <a:srgbClr val="404040"/>
-              </a:solidFill>
-              <a:latin typeface="Calibri"/>
-            </a:endParaRPr>
-          </a:p>
-        </p:txBody>
-      </p:sp>
-      <p:sp>
-        <p:nvSpPr>
-          <p:cNvPr id="69" name="PlaceHolder 4"/>
+            <a:endParaRPr b="0" lang="en-IN" sz="3200" spc="-1" strike="noStrike">
+              <a:latin typeface="Arial"/>
+            </a:endParaRPr>
+          </a:p>
+        </p:txBody>
+      </p:sp>
+      <p:sp>
+        <p:nvSpPr>
+          <p:cNvPr id="66" name="PlaceHolder 4"/>
           <p:cNvSpPr>
             <a:spLocks noGrp="1"/>
           </p:cNvSpPr>
@@ -1549,8 +1458,8 @@
         </p:nvSpPr>
         <p:spPr>
           <a:xfrm>
-            <a:off x="504000" y="3044520"/>
-            <a:ext cx="9072000" cy="1568520"/>
+            <a:off x="504000" y="3044160"/>
+            <a:ext cx="9071640" cy="1568160"/>
           </a:xfrm>
           <a:prstGeom prst="rect">
             <a:avLst/>
@@ -1561,11 +1470,8 @@
             <a:normAutofit/>
           </a:bodyPr>
           <a:p>
-            <a:endParaRPr b="0" lang="en-US" sz="2000" spc="-1" strike="noStrike">
-              <a:solidFill>
-                <a:srgbClr val="404040"/>
-              </a:solidFill>
-              <a:latin typeface="Calibri"/>
+            <a:endParaRPr b="0" lang="en-IN" sz="3200" spc="-1" strike="noStrike">
+              <a:latin typeface="Arial"/>
             </a:endParaRPr>
           </a:p>
         </p:txBody>
@@ -1594,7 +1500,7 @@
       </p:grpSpPr>
       <p:sp>
         <p:nvSpPr>
-          <p:cNvPr id="70" name="PlaceHolder 1"/>
+          <p:cNvPr id="67" name="PlaceHolder 1"/>
           <p:cNvSpPr>
             <a:spLocks noGrp="1"/>
           </p:cNvSpPr>
@@ -1605,7 +1511,7 @@
         <p:spPr>
           <a:xfrm>
             <a:off x="504000" y="226080"/>
-            <a:ext cx="9070920" cy="945720"/>
+            <a:ext cx="9070560" cy="945360"/>
           </a:xfrm>
           <a:prstGeom prst="rect">
             <a:avLst/>
@@ -1616,18 +1522,16 @@
             <a:noAutofit/>
           </a:bodyPr>
           <a:p>
-            <a:endParaRPr b="0" lang="en-US" sz="1800" spc="-1" strike="noStrike">
-              <a:solidFill>
-                <a:srgbClr val="000000"/>
-              </a:solidFill>
-              <a:latin typeface="Calibri"/>
-            </a:endParaRPr>
-          </a:p>
-        </p:txBody>
-      </p:sp>
-      <p:sp>
-        <p:nvSpPr>
-          <p:cNvPr id="71" name="PlaceHolder 2"/>
+            <a:pPr algn="ctr"/>
+            <a:endParaRPr b="0" lang="en-IN" sz="4400" spc="-1" strike="noStrike">
+              <a:latin typeface="Arial"/>
+            </a:endParaRPr>
+          </a:p>
+        </p:txBody>
+      </p:sp>
+      <p:sp>
+        <p:nvSpPr>
+          <p:cNvPr id="68" name="PlaceHolder 2"/>
           <p:cNvSpPr>
             <a:spLocks noGrp="1"/>
           </p:cNvSpPr>
@@ -1638,7 +1542,7 @@
         <p:spPr>
           <a:xfrm>
             <a:off x="504000" y="1326600"/>
-            <a:ext cx="9072000" cy="1568520"/>
+            <a:ext cx="9071640" cy="1568160"/>
           </a:xfrm>
           <a:prstGeom prst="rect">
             <a:avLst/>
@@ -1649,18 +1553,15 @@
             <a:normAutofit/>
           </a:bodyPr>
           <a:p>
-            <a:endParaRPr b="0" lang="en-US" sz="2000" spc="-1" strike="noStrike">
-              <a:solidFill>
-                <a:srgbClr val="404040"/>
-              </a:solidFill>
-              <a:latin typeface="Calibri"/>
-            </a:endParaRPr>
-          </a:p>
-        </p:txBody>
-      </p:sp>
-      <p:sp>
-        <p:nvSpPr>
-          <p:cNvPr id="72" name="PlaceHolder 3"/>
+            <a:endParaRPr b="0" lang="en-IN" sz="3200" spc="-1" strike="noStrike">
+              <a:latin typeface="Arial"/>
+            </a:endParaRPr>
+          </a:p>
+        </p:txBody>
+      </p:sp>
+      <p:sp>
+        <p:nvSpPr>
+          <p:cNvPr id="69" name="PlaceHolder 3"/>
           <p:cNvSpPr>
             <a:spLocks noGrp="1"/>
           </p:cNvSpPr>
@@ -1670,8 +1571,8 @@
         </p:nvSpPr>
         <p:spPr>
           <a:xfrm>
-            <a:off x="504000" y="3044520"/>
-            <a:ext cx="9072000" cy="1568520"/>
+            <a:off x="504000" y="3044160"/>
+            <a:ext cx="9071640" cy="1568160"/>
           </a:xfrm>
           <a:prstGeom prst="rect">
             <a:avLst/>
@@ -1682,11 +1583,8 @@
             <a:normAutofit/>
           </a:bodyPr>
           <a:p>
-            <a:endParaRPr b="0" lang="en-US" sz="2000" spc="-1" strike="noStrike">
-              <a:solidFill>
-                <a:srgbClr val="404040"/>
-              </a:solidFill>
-              <a:latin typeface="Calibri"/>
+            <a:endParaRPr b="0" lang="en-IN" sz="3200" spc="-1" strike="noStrike">
+              <a:latin typeface="Arial"/>
             </a:endParaRPr>
           </a:p>
         </p:txBody>
@@ -1715,7 +1613,7 @@
       </p:grpSpPr>
       <p:sp>
         <p:nvSpPr>
-          <p:cNvPr id="73" name="PlaceHolder 1"/>
+          <p:cNvPr id="70" name="PlaceHolder 1"/>
           <p:cNvSpPr>
             <a:spLocks noGrp="1"/>
           </p:cNvSpPr>
@@ -1726,7 +1624,7 @@
         <p:spPr>
           <a:xfrm>
             <a:off x="504000" y="226080"/>
-            <a:ext cx="9070920" cy="945720"/>
+            <a:ext cx="9070560" cy="945360"/>
           </a:xfrm>
           <a:prstGeom prst="rect">
             <a:avLst/>
@@ -1737,18 +1635,16 @@
             <a:noAutofit/>
           </a:bodyPr>
           <a:p>
-            <a:endParaRPr b="0" lang="en-US" sz="1800" spc="-1" strike="noStrike">
-              <a:solidFill>
-                <a:srgbClr val="000000"/>
-              </a:solidFill>
-              <a:latin typeface="Calibri"/>
-            </a:endParaRPr>
-          </a:p>
-        </p:txBody>
-      </p:sp>
-      <p:sp>
-        <p:nvSpPr>
-          <p:cNvPr id="74" name="PlaceHolder 2"/>
+            <a:pPr algn="ctr"/>
+            <a:endParaRPr b="0" lang="en-IN" sz="4400" spc="-1" strike="noStrike">
+              <a:latin typeface="Arial"/>
+            </a:endParaRPr>
+          </a:p>
+        </p:txBody>
+      </p:sp>
+      <p:sp>
+        <p:nvSpPr>
+          <p:cNvPr id="71" name="PlaceHolder 2"/>
           <p:cNvSpPr>
             <a:spLocks noGrp="1"/>
           </p:cNvSpPr>
@@ -1759,7 +1655,7 @@
         <p:spPr>
           <a:xfrm>
             <a:off x="504000" y="1326600"/>
-            <a:ext cx="4426920" cy="1568520"/>
+            <a:ext cx="4426920" cy="1568160"/>
           </a:xfrm>
           <a:prstGeom prst="rect">
             <a:avLst/>
@@ -1770,18 +1666,15 @@
             <a:normAutofit/>
           </a:bodyPr>
           <a:p>
-            <a:endParaRPr b="0" lang="en-US" sz="2000" spc="-1" strike="noStrike">
-              <a:solidFill>
-                <a:srgbClr val="404040"/>
-              </a:solidFill>
-              <a:latin typeface="Calibri"/>
-            </a:endParaRPr>
-          </a:p>
-        </p:txBody>
-      </p:sp>
-      <p:sp>
-        <p:nvSpPr>
-          <p:cNvPr id="75" name="PlaceHolder 3"/>
+            <a:endParaRPr b="0" lang="en-IN" sz="3200" spc="-1" strike="noStrike">
+              <a:latin typeface="Arial"/>
+            </a:endParaRPr>
+          </a:p>
+        </p:txBody>
+      </p:sp>
+      <p:sp>
+        <p:nvSpPr>
+          <p:cNvPr id="72" name="PlaceHolder 3"/>
           <p:cNvSpPr>
             <a:spLocks noGrp="1"/>
           </p:cNvSpPr>
@@ -1792,7 +1685,7 @@
         <p:spPr>
           <a:xfrm>
             <a:off x="5152680" y="1326600"/>
-            <a:ext cx="4426920" cy="1568520"/>
+            <a:ext cx="4426920" cy="1568160"/>
           </a:xfrm>
           <a:prstGeom prst="rect">
             <a:avLst/>
@@ -1803,18 +1696,15 @@
             <a:normAutofit/>
           </a:bodyPr>
           <a:p>
-            <a:endParaRPr b="0" lang="en-US" sz="2000" spc="-1" strike="noStrike">
-              <a:solidFill>
-                <a:srgbClr val="404040"/>
-              </a:solidFill>
-              <a:latin typeface="Calibri"/>
-            </a:endParaRPr>
-          </a:p>
-        </p:txBody>
-      </p:sp>
-      <p:sp>
-        <p:nvSpPr>
-          <p:cNvPr id="76" name="PlaceHolder 4"/>
+            <a:endParaRPr b="0" lang="en-IN" sz="3200" spc="-1" strike="noStrike">
+              <a:latin typeface="Arial"/>
+            </a:endParaRPr>
+          </a:p>
+        </p:txBody>
+      </p:sp>
+      <p:sp>
+        <p:nvSpPr>
+          <p:cNvPr id="73" name="PlaceHolder 4"/>
           <p:cNvSpPr>
             <a:spLocks noGrp="1"/>
           </p:cNvSpPr>
@@ -1824,8 +1714,8 @@
         </p:nvSpPr>
         <p:spPr>
           <a:xfrm>
-            <a:off x="504000" y="3044520"/>
-            <a:ext cx="4426920" cy="1568520"/>
+            <a:off x="504000" y="3044160"/>
+            <a:ext cx="4426920" cy="1568160"/>
           </a:xfrm>
           <a:prstGeom prst="rect">
             <a:avLst/>
@@ -1836,18 +1726,15 @@
             <a:normAutofit/>
           </a:bodyPr>
           <a:p>
-            <a:endParaRPr b="0" lang="en-US" sz="2000" spc="-1" strike="noStrike">
-              <a:solidFill>
-                <a:srgbClr val="404040"/>
-              </a:solidFill>
-              <a:latin typeface="Calibri"/>
-            </a:endParaRPr>
-          </a:p>
-        </p:txBody>
-      </p:sp>
-      <p:sp>
-        <p:nvSpPr>
-          <p:cNvPr id="77" name="PlaceHolder 5"/>
+            <a:endParaRPr b="0" lang="en-IN" sz="3200" spc="-1" strike="noStrike">
+              <a:latin typeface="Arial"/>
+            </a:endParaRPr>
+          </a:p>
+        </p:txBody>
+      </p:sp>
+      <p:sp>
+        <p:nvSpPr>
+          <p:cNvPr id="74" name="PlaceHolder 5"/>
           <p:cNvSpPr>
             <a:spLocks noGrp="1"/>
           </p:cNvSpPr>
@@ -1857,8 +1744,8 @@
         </p:nvSpPr>
         <p:spPr>
           <a:xfrm>
-            <a:off x="5152680" y="3044520"/>
-            <a:ext cx="4426920" cy="1568520"/>
+            <a:off x="5152680" y="3044160"/>
+            <a:ext cx="4426920" cy="1568160"/>
           </a:xfrm>
           <a:prstGeom prst="rect">
             <a:avLst/>
@@ -1869,11 +1756,8 @@
             <a:normAutofit/>
           </a:bodyPr>
           <a:p>
-            <a:endParaRPr b="0" lang="en-US" sz="2000" spc="-1" strike="noStrike">
-              <a:solidFill>
-                <a:srgbClr val="404040"/>
-              </a:solidFill>
-              <a:latin typeface="Calibri"/>
+            <a:endParaRPr b="0" lang="en-IN" sz="3200" spc="-1" strike="noStrike">
+              <a:latin typeface="Arial"/>
             </a:endParaRPr>
           </a:p>
         </p:txBody>
@@ -1902,7 +1786,7 @@
       </p:grpSpPr>
       <p:sp>
         <p:nvSpPr>
-          <p:cNvPr id="78" name="PlaceHolder 1"/>
+          <p:cNvPr id="75" name="PlaceHolder 1"/>
           <p:cNvSpPr>
             <a:spLocks noGrp="1"/>
           </p:cNvSpPr>
@@ -1913,7 +1797,7 @@
         <p:spPr>
           <a:xfrm>
             <a:off x="504000" y="226080"/>
-            <a:ext cx="9070920" cy="945720"/>
+            <a:ext cx="9070560" cy="945360"/>
           </a:xfrm>
           <a:prstGeom prst="rect">
             <a:avLst/>
@@ -1924,18 +1808,16 @@
             <a:noAutofit/>
           </a:bodyPr>
           <a:p>
-            <a:endParaRPr b="0" lang="en-US" sz="1800" spc="-1" strike="noStrike">
-              <a:solidFill>
-                <a:srgbClr val="000000"/>
-              </a:solidFill>
-              <a:latin typeface="Calibri"/>
-            </a:endParaRPr>
-          </a:p>
-        </p:txBody>
-      </p:sp>
-      <p:sp>
-        <p:nvSpPr>
-          <p:cNvPr id="79" name="PlaceHolder 2"/>
+            <a:pPr algn="ctr"/>
+            <a:endParaRPr b="0" lang="en-IN" sz="4400" spc="-1" strike="noStrike">
+              <a:latin typeface="Arial"/>
+            </a:endParaRPr>
+          </a:p>
+        </p:txBody>
+      </p:sp>
+      <p:sp>
+        <p:nvSpPr>
+          <p:cNvPr id="76" name="PlaceHolder 2"/>
           <p:cNvSpPr>
             <a:spLocks noGrp="1"/>
           </p:cNvSpPr>
@@ -1946,7 +1828,7 @@
         <p:spPr>
           <a:xfrm>
             <a:off x="504000" y="1326600"/>
-            <a:ext cx="2921040" cy="1568520"/>
+            <a:ext cx="2920680" cy="1568160"/>
           </a:xfrm>
           <a:prstGeom prst="rect">
             <a:avLst/>
@@ -1957,18 +1839,15 @@
             <a:normAutofit/>
           </a:bodyPr>
           <a:p>
-            <a:endParaRPr b="0" lang="en-US" sz="2000" spc="-1" strike="noStrike">
-              <a:solidFill>
-                <a:srgbClr val="404040"/>
-              </a:solidFill>
-              <a:latin typeface="Calibri"/>
-            </a:endParaRPr>
-          </a:p>
-        </p:txBody>
-      </p:sp>
-      <p:sp>
-        <p:nvSpPr>
-          <p:cNvPr id="80" name="PlaceHolder 3"/>
+            <a:endParaRPr b="0" lang="en-IN" sz="3200" spc="-1" strike="noStrike">
+              <a:latin typeface="Arial"/>
+            </a:endParaRPr>
+          </a:p>
+        </p:txBody>
+      </p:sp>
+      <p:sp>
+        <p:nvSpPr>
+          <p:cNvPr id="77" name="PlaceHolder 3"/>
           <p:cNvSpPr>
             <a:spLocks noGrp="1"/>
           </p:cNvSpPr>
@@ -1978,8 +1857,8 @@
         </p:nvSpPr>
         <p:spPr>
           <a:xfrm>
-            <a:off x="3571560" y="1326600"/>
-            <a:ext cx="2921040" cy="1568520"/>
+            <a:off x="3571200" y="1326600"/>
+            <a:ext cx="2920680" cy="1568160"/>
           </a:xfrm>
           <a:prstGeom prst="rect">
             <a:avLst/>
@@ -1990,18 +1869,15 @@
             <a:normAutofit/>
           </a:bodyPr>
           <a:p>
-            <a:endParaRPr b="0" lang="en-US" sz="2000" spc="-1" strike="noStrike">
-              <a:solidFill>
-                <a:srgbClr val="404040"/>
-              </a:solidFill>
-              <a:latin typeface="Calibri"/>
-            </a:endParaRPr>
-          </a:p>
-        </p:txBody>
-      </p:sp>
-      <p:sp>
-        <p:nvSpPr>
-          <p:cNvPr id="81" name="PlaceHolder 4"/>
+            <a:endParaRPr b="0" lang="en-IN" sz="3200" spc="-1" strike="noStrike">
+              <a:latin typeface="Arial"/>
+            </a:endParaRPr>
+          </a:p>
+        </p:txBody>
+      </p:sp>
+      <p:sp>
+        <p:nvSpPr>
+          <p:cNvPr id="78" name="PlaceHolder 4"/>
           <p:cNvSpPr>
             <a:spLocks noGrp="1"/>
           </p:cNvSpPr>
@@ -2011,8 +1887,8 @@
         </p:nvSpPr>
         <p:spPr>
           <a:xfrm>
-            <a:off x="6639120" y="1326600"/>
-            <a:ext cx="2921040" cy="1568520"/>
+            <a:off x="6638040" y="1326600"/>
+            <a:ext cx="2920680" cy="1568160"/>
           </a:xfrm>
           <a:prstGeom prst="rect">
             <a:avLst/>
@@ -2023,18 +1899,15 @@
             <a:normAutofit/>
           </a:bodyPr>
           <a:p>
-            <a:endParaRPr b="0" lang="en-US" sz="2000" spc="-1" strike="noStrike">
-              <a:solidFill>
-                <a:srgbClr val="404040"/>
-              </a:solidFill>
-              <a:latin typeface="Calibri"/>
-            </a:endParaRPr>
-          </a:p>
-        </p:txBody>
-      </p:sp>
-      <p:sp>
-        <p:nvSpPr>
-          <p:cNvPr id="82" name="PlaceHolder 5"/>
+            <a:endParaRPr b="0" lang="en-IN" sz="3200" spc="-1" strike="noStrike">
+              <a:latin typeface="Arial"/>
+            </a:endParaRPr>
+          </a:p>
+        </p:txBody>
+      </p:sp>
+      <p:sp>
+        <p:nvSpPr>
+          <p:cNvPr id="79" name="PlaceHolder 5"/>
           <p:cNvSpPr>
             <a:spLocks noGrp="1"/>
           </p:cNvSpPr>
@@ -2044,8 +1917,8 @@
         </p:nvSpPr>
         <p:spPr>
           <a:xfrm>
-            <a:off x="504000" y="3044520"/>
-            <a:ext cx="2921040" cy="1568520"/>
+            <a:off x="504000" y="3044160"/>
+            <a:ext cx="2920680" cy="1568160"/>
           </a:xfrm>
           <a:prstGeom prst="rect">
             <a:avLst/>
@@ -2056,18 +1929,15 @@
             <a:normAutofit/>
           </a:bodyPr>
           <a:p>
-            <a:endParaRPr b="0" lang="en-US" sz="2000" spc="-1" strike="noStrike">
-              <a:solidFill>
-                <a:srgbClr val="404040"/>
-              </a:solidFill>
-              <a:latin typeface="Calibri"/>
-            </a:endParaRPr>
-          </a:p>
-        </p:txBody>
-      </p:sp>
-      <p:sp>
-        <p:nvSpPr>
-          <p:cNvPr id="83" name="PlaceHolder 6"/>
+            <a:endParaRPr b="0" lang="en-IN" sz="3200" spc="-1" strike="noStrike">
+              <a:latin typeface="Arial"/>
+            </a:endParaRPr>
+          </a:p>
+        </p:txBody>
+      </p:sp>
+      <p:sp>
+        <p:nvSpPr>
+          <p:cNvPr id="80" name="PlaceHolder 6"/>
           <p:cNvSpPr>
             <a:spLocks noGrp="1"/>
           </p:cNvSpPr>
@@ -2077,8 +1947,8 @@
         </p:nvSpPr>
         <p:spPr>
           <a:xfrm>
-            <a:off x="3571560" y="3044520"/>
-            <a:ext cx="2921040" cy="1568520"/>
+            <a:off x="3571200" y="3044160"/>
+            <a:ext cx="2920680" cy="1568160"/>
           </a:xfrm>
           <a:prstGeom prst="rect">
             <a:avLst/>
@@ -2089,18 +1959,15 @@
             <a:normAutofit/>
           </a:bodyPr>
           <a:p>
-            <a:endParaRPr b="0" lang="en-US" sz="2000" spc="-1" strike="noStrike">
-              <a:solidFill>
-                <a:srgbClr val="404040"/>
-              </a:solidFill>
-              <a:latin typeface="Calibri"/>
-            </a:endParaRPr>
-          </a:p>
-        </p:txBody>
-      </p:sp>
-      <p:sp>
-        <p:nvSpPr>
-          <p:cNvPr id="84" name="PlaceHolder 7"/>
+            <a:endParaRPr b="0" lang="en-IN" sz="3200" spc="-1" strike="noStrike">
+              <a:latin typeface="Arial"/>
+            </a:endParaRPr>
+          </a:p>
+        </p:txBody>
+      </p:sp>
+      <p:sp>
+        <p:nvSpPr>
+          <p:cNvPr id="81" name="PlaceHolder 7"/>
           <p:cNvSpPr>
             <a:spLocks noGrp="1"/>
           </p:cNvSpPr>
@@ -2110,8 +1977,8 @@
         </p:nvSpPr>
         <p:spPr>
           <a:xfrm>
-            <a:off x="6639120" y="3044520"/>
-            <a:ext cx="2921040" cy="1568520"/>
+            <a:off x="6638040" y="3044160"/>
+            <a:ext cx="2920680" cy="1568160"/>
           </a:xfrm>
           <a:prstGeom prst="rect">
             <a:avLst/>
@@ -2122,11 +1989,8 @@
             <a:normAutofit/>
           </a:bodyPr>
           <a:p>
-            <a:endParaRPr b="0" lang="en-US" sz="2000" spc="-1" strike="noStrike">
-              <a:solidFill>
-                <a:srgbClr val="404040"/>
-              </a:solidFill>
-              <a:latin typeface="Calibri"/>
+            <a:endParaRPr b="0" lang="en-IN" sz="3200" spc="-1" strike="noStrike">
+              <a:latin typeface="Arial"/>
             </a:endParaRPr>
           </a:p>
         </p:txBody>
@@ -2155,7 +2019,7 @@
       </p:grpSpPr>
       <p:sp>
         <p:nvSpPr>
-          <p:cNvPr id="10" name="PlaceHolder 1"/>
+          <p:cNvPr id="7" name="PlaceHolder 1"/>
           <p:cNvSpPr>
             <a:spLocks noGrp="1"/>
           </p:cNvSpPr>
@@ -2166,7 +2030,7 @@
         <p:spPr>
           <a:xfrm>
             <a:off x="504000" y="226080"/>
-            <a:ext cx="9070920" cy="945720"/>
+            <a:ext cx="9070560" cy="945360"/>
           </a:xfrm>
           <a:prstGeom prst="rect">
             <a:avLst/>
@@ -2177,18 +2041,16 @@
             <a:noAutofit/>
           </a:bodyPr>
           <a:p>
-            <a:endParaRPr b="0" lang="en-US" sz="1800" spc="-1" strike="noStrike">
-              <a:solidFill>
-                <a:srgbClr val="000000"/>
-              </a:solidFill>
-              <a:latin typeface="Calibri"/>
-            </a:endParaRPr>
-          </a:p>
-        </p:txBody>
-      </p:sp>
-      <p:sp>
-        <p:nvSpPr>
-          <p:cNvPr id="11" name="PlaceHolder 2"/>
+            <a:pPr algn="ctr"/>
+            <a:endParaRPr b="0" lang="en-IN" sz="4400" spc="-1" strike="noStrike">
+              <a:latin typeface="Arial"/>
+            </a:endParaRPr>
+          </a:p>
+        </p:txBody>
+      </p:sp>
+      <p:sp>
+        <p:nvSpPr>
+          <p:cNvPr id="8" name="PlaceHolder 2"/>
           <p:cNvSpPr>
             <a:spLocks noGrp="1"/>
           </p:cNvSpPr>
@@ -2199,7 +2061,7 @@
         <p:spPr>
           <a:xfrm>
             <a:off x="504000" y="1326600"/>
-            <a:ext cx="9072000" cy="3288600"/>
+            <a:ext cx="9071640" cy="3288240"/>
           </a:xfrm>
           <a:prstGeom prst="rect">
             <a:avLst/>
@@ -2210,11 +2072,8 @@
             <a:normAutofit/>
           </a:bodyPr>
           <a:p>
-            <a:endParaRPr b="0" lang="en-US" sz="2000" spc="-1" strike="noStrike">
-              <a:solidFill>
-                <a:srgbClr val="404040"/>
-              </a:solidFill>
-              <a:latin typeface="Calibri"/>
+            <a:endParaRPr b="0" lang="en-IN" sz="3200" spc="-1" strike="noStrike">
+              <a:latin typeface="Arial"/>
             </a:endParaRPr>
           </a:p>
         </p:txBody>
@@ -2243,7 +2102,7 @@
       </p:grpSpPr>
       <p:sp>
         <p:nvSpPr>
-          <p:cNvPr id="12" name="PlaceHolder 1"/>
+          <p:cNvPr id="9" name="PlaceHolder 1"/>
           <p:cNvSpPr>
             <a:spLocks noGrp="1"/>
           </p:cNvSpPr>
@@ -2254,7 +2113,7 @@
         <p:spPr>
           <a:xfrm>
             <a:off x="504000" y="226080"/>
-            <a:ext cx="9070920" cy="945720"/>
+            <a:ext cx="9070560" cy="945360"/>
           </a:xfrm>
           <a:prstGeom prst="rect">
             <a:avLst/>
@@ -2265,18 +2124,16 @@
             <a:noAutofit/>
           </a:bodyPr>
           <a:p>
-            <a:endParaRPr b="0" lang="en-US" sz="1800" spc="-1" strike="noStrike">
-              <a:solidFill>
-                <a:srgbClr val="000000"/>
-              </a:solidFill>
-              <a:latin typeface="Calibri"/>
-            </a:endParaRPr>
-          </a:p>
-        </p:txBody>
-      </p:sp>
-      <p:sp>
-        <p:nvSpPr>
-          <p:cNvPr id="13" name="PlaceHolder 2"/>
+            <a:pPr algn="ctr"/>
+            <a:endParaRPr b="0" lang="en-IN" sz="4400" spc="-1" strike="noStrike">
+              <a:latin typeface="Arial"/>
+            </a:endParaRPr>
+          </a:p>
+        </p:txBody>
+      </p:sp>
+      <p:sp>
+        <p:nvSpPr>
+          <p:cNvPr id="10" name="PlaceHolder 2"/>
           <p:cNvSpPr>
             <a:spLocks noGrp="1"/>
           </p:cNvSpPr>
@@ -2287,7 +2144,7 @@
         <p:spPr>
           <a:xfrm>
             <a:off x="504000" y="1326600"/>
-            <a:ext cx="4426920" cy="3288600"/>
+            <a:ext cx="4426920" cy="3288240"/>
           </a:xfrm>
           <a:prstGeom prst="rect">
             <a:avLst/>
@@ -2298,18 +2155,15 @@
             <a:normAutofit/>
           </a:bodyPr>
           <a:p>
-            <a:endParaRPr b="0" lang="en-US" sz="2000" spc="-1" strike="noStrike">
-              <a:solidFill>
-                <a:srgbClr val="404040"/>
-              </a:solidFill>
-              <a:latin typeface="Calibri"/>
-            </a:endParaRPr>
-          </a:p>
-        </p:txBody>
-      </p:sp>
-      <p:sp>
-        <p:nvSpPr>
-          <p:cNvPr id="14" name="PlaceHolder 3"/>
+            <a:endParaRPr b="0" lang="en-IN" sz="3200" spc="-1" strike="noStrike">
+              <a:latin typeface="Arial"/>
+            </a:endParaRPr>
+          </a:p>
+        </p:txBody>
+      </p:sp>
+      <p:sp>
+        <p:nvSpPr>
+          <p:cNvPr id="11" name="PlaceHolder 3"/>
           <p:cNvSpPr>
             <a:spLocks noGrp="1"/>
           </p:cNvSpPr>
@@ -2320,7 +2174,7 @@
         <p:spPr>
           <a:xfrm>
             <a:off x="5152680" y="1326600"/>
-            <a:ext cx="4426920" cy="3288600"/>
+            <a:ext cx="4426920" cy="3288240"/>
           </a:xfrm>
           <a:prstGeom prst="rect">
             <a:avLst/>
@@ -2331,11 +2185,8 @@
             <a:normAutofit/>
           </a:bodyPr>
           <a:p>
-            <a:endParaRPr b="0" lang="en-US" sz="2000" spc="-1" strike="noStrike">
-              <a:solidFill>
-                <a:srgbClr val="404040"/>
-              </a:solidFill>
-              <a:latin typeface="Calibri"/>
+            <a:endParaRPr b="0" lang="en-IN" sz="3200" spc="-1" strike="noStrike">
+              <a:latin typeface="Arial"/>
             </a:endParaRPr>
           </a:p>
         </p:txBody>
@@ -2364,7 +2215,7 @@
       </p:grpSpPr>
       <p:sp>
         <p:nvSpPr>
-          <p:cNvPr id="15" name="PlaceHolder 1"/>
+          <p:cNvPr id="12" name="PlaceHolder 1"/>
           <p:cNvSpPr>
             <a:spLocks noGrp="1"/>
           </p:cNvSpPr>
@@ -2375,7 +2226,7 @@
         <p:spPr>
           <a:xfrm>
             <a:off x="504000" y="226080"/>
-            <a:ext cx="9070920" cy="945720"/>
+            <a:ext cx="9070560" cy="945360"/>
           </a:xfrm>
           <a:prstGeom prst="rect">
             <a:avLst/>
@@ -2386,11 +2237,9 @@
             <a:noAutofit/>
           </a:bodyPr>
           <a:p>
-            <a:endParaRPr b="0" lang="en-US" sz="1800" spc="-1" strike="noStrike">
-              <a:solidFill>
-                <a:srgbClr val="000000"/>
-              </a:solidFill>
-              <a:latin typeface="Calibri"/>
+            <a:pPr algn="ctr"/>
+            <a:endParaRPr b="0" lang="en-IN" sz="4400" spc="-1" strike="noStrike">
+              <a:latin typeface="Arial"/>
             </a:endParaRPr>
           </a:p>
         </p:txBody>
@@ -2419,7 +2268,7 @@
       </p:grpSpPr>
       <p:sp>
         <p:nvSpPr>
-          <p:cNvPr id="16" name="PlaceHolder 1"/>
+          <p:cNvPr id="13" name="PlaceHolder 1"/>
           <p:cNvSpPr>
             <a:spLocks noGrp="1"/>
           </p:cNvSpPr>
@@ -2430,7 +2279,7 @@
         <p:spPr>
           <a:xfrm>
             <a:off x="504000" y="226080"/>
-            <a:ext cx="9070920" cy="4385160"/>
+            <a:ext cx="9070560" cy="4383360"/>
           </a:xfrm>
           <a:prstGeom prst="rect">
             <a:avLst/>
@@ -2472,7 +2321,7 @@
       </p:grpSpPr>
       <p:sp>
         <p:nvSpPr>
-          <p:cNvPr id="17" name="PlaceHolder 1"/>
+          <p:cNvPr id="14" name="PlaceHolder 1"/>
           <p:cNvSpPr>
             <a:spLocks noGrp="1"/>
           </p:cNvSpPr>
@@ -2483,7 +2332,7 @@
         <p:spPr>
           <a:xfrm>
             <a:off x="504000" y="226080"/>
-            <a:ext cx="9070920" cy="945720"/>
+            <a:ext cx="9070560" cy="945360"/>
           </a:xfrm>
           <a:prstGeom prst="rect">
             <a:avLst/>
@@ -2494,18 +2343,16 @@
             <a:noAutofit/>
           </a:bodyPr>
           <a:p>
-            <a:endParaRPr b="0" lang="en-US" sz="1800" spc="-1" strike="noStrike">
-              <a:solidFill>
-                <a:srgbClr val="000000"/>
-              </a:solidFill>
-              <a:latin typeface="Calibri"/>
-            </a:endParaRPr>
-          </a:p>
-        </p:txBody>
-      </p:sp>
-      <p:sp>
-        <p:nvSpPr>
-          <p:cNvPr id="18" name="PlaceHolder 2"/>
+            <a:pPr algn="ctr"/>
+            <a:endParaRPr b="0" lang="en-IN" sz="4400" spc="-1" strike="noStrike">
+              <a:latin typeface="Arial"/>
+            </a:endParaRPr>
+          </a:p>
+        </p:txBody>
+      </p:sp>
+      <p:sp>
+        <p:nvSpPr>
+          <p:cNvPr id="15" name="PlaceHolder 2"/>
           <p:cNvSpPr>
             <a:spLocks noGrp="1"/>
           </p:cNvSpPr>
@@ -2516,7 +2363,7 @@
         <p:spPr>
           <a:xfrm>
             <a:off x="504000" y="1326600"/>
-            <a:ext cx="4426920" cy="1568520"/>
+            <a:ext cx="4426920" cy="1568160"/>
           </a:xfrm>
           <a:prstGeom prst="rect">
             <a:avLst/>
@@ -2527,18 +2374,15 @@
             <a:normAutofit/>
           </a:bodyPr>
           <a:p>
-            <a:endParaRPr b="0" lang="en-US" sz="2000" spc="-1" strike="noStrike">
-              <a:solidFill>
-                <a:srgbClr val="404040"/>
-              </a:solidFill>
-              <a:latin typeface="Calibri"/>
-            </a:endParaRPr>
-          </a:p>
-        </p:txBody>
-      </p:sp>
-      <p:sp>
-        <p:nvSpPr>
-          <p:cNvPr id="19" name="PlaceHolder 3"/>
+            <a:endParaRPr b="0" lang="en-IN" sz="3200" spc="-1" strike="noStrike">
+              <a:latin typeface="Arial"/>
+            </a:endParaRPr>
+          </a:p>
+        </p:txBody>
+      </p:sp>
+      <p:sp>
+        <p:nvSpPr>
+          <p:cNvPr id="16" name="PlaceHolder 3"/>
           <p:cNvSpPr>
             <a:spLocks noGrp="1"/>
           </p:cNvSpPr>
@@ -2549,7 +2393,7 @@
         <p:spPr>
           <a:xfrm>
             <a:off x="5152680" y="1326600"/>
-            <a:ext cx="4426920" cy="3288600"/>
+            <a:ext cx="4426920" cy="3288240"/>
           </a:xfrm>
           <a:prstGeom prst="rect">
             <a:avLst/>
@@ -2560,18 +2404,15 @@
             <a:normAutofit/>
           </a:bodyPr>
           <a:p>
-            <a:endParaRPr b="0" lang="en-US" sz="2000" spc="-1" strike="noStrike">
-              <a:solidFill>
-                <a:srgbClr val="404040"/>
-              </a:solidFill>
-              <a:latin typeface="Calibri"/>
-            </a:endParaRPr>
-          </a:p>
-        </p:txBody>
-      </p:sp>
-      <p:sp>
-        <p:nvSpPr>
-          <p:cNvPr id="20" name="PlaceHolder 4"/>
+            <a:endParaRPr b="0" lang="en-IN" sz="3200" spc="-1" strike="noStrike">
+              <a:latin typeface="Arial"/>
+            </a:endParaRPr>
+          </a:p>
+        </p:txBody>
+      </p:sp>
+      <p:sp>
+        <p:nvSpPr>
+          <p:cNvPr id="17" name="PlaceHolder 4"/>
           <p:cNvSpPr>
             <a:spLocks noGrp="1"/>
           </p:cNvSpPr>
@@ -2581,8 +2422,8 @@
         </p:nvSpPr>
         <p:spPr>
           <a:xfrm>
-            <a:off x="504000" y="3044520"/>
-            <a:ext cx="4426920" cy="1568520"/>
+            <a:off x="504000" y="3044160"/>
+            <a:ext cx="4426920" cy="1568160"/>
           </a:xfrm>
           <a:prstGeom prst="rect">
             <a:avLst/>
@@ -2593,11 +2434,8 @@
             <a:normAutofit/>
           </a:bodyPr>
           <a:p>
-            <a:endParaRPr b="0" lang="en-US" sz="2000" spc="-1" strike="noStrike">
-              <a:solidFill>
-                <a:srgbClr val="404040"/>
-              </a:solidFill>
-              <a:latin typeface="Calibri"/>
+            <a:endParaRPr b="0" lang="en-IN" sz="3200" spc="-1" strike="noStrike">
+              <a:latin typeface="Arial"/>
             </a:endParaRPr>
           </a:p>
         </p:txBody>
@@ -2626,7 +2464,7 @@
       </p:grpSpPr>
       <p:sp>
         <p:nvSpPr>
-          <p:cNvPr id="21" name="PlaceHolder 1"/>
+          <p:cNvPr id="18" name="PlaceHolder 1"/>
           <p:cNvSpPr>
             <a:spLocks noGrp="1"/>
           </p:cNvSpPr>
@@ -2637,7 +2475,7 @@
         <p:spPr>
           <a:xfrm>
             <a:off x="504000" y="226080"/>
-            <a:ext cx="9070920" cy="945720"/>
+            <a:ext cx="9070560" cy="945360"/>
           </a:xfrm>
           <a:prstGeom prst="rect">
             <a:avLst/>
@@ -2648,18 +2486,16 @@
             <a:noAutofit/>
           </a:bodyPr>
           <a:p>
-            <a:endParaRPr b="0" lang="en-US" sz="1800" spc="-1" strike="noStrike">
-              <a:solidFill>
-                <a:srgbClr val="000000"/>
-              </a:solidFill>
-              <a:latin typeface="Calibri"/>
-            </a:endParaRPr>
-          </a:p>
-        </p:txBody>
-      </p:sp>
-      <p:sp>
-        <p:nvSpPr>
-          <p:cNvPr id="22" name="PlaceHolder 2"/>
+            <a:pPr algn="ctr"/>
+            <a:endParaRPr b="0" lang="en-IN" sz="4400" spc="-1" strike="noStrike">
+              <a:latin typeface="Arial"/>
+            </a:endParaRPr>
+          </a:p>
+        </p:txBody>
+      </p:sp>
+      <p:sp>
+        <p:nvSpPr>
+          <p:cNvPr id="19" name="PlaceHolder 2"/>
           <p:cNvSpPr>
             <a:spLocks noGrp="1"/>
           </p:cNvSpPr>
@@ -2670,7 +2506,7 @@
         <p:spPr>
           <a:xfrm>
             <a:off x="504000" y="1326600"/>
-            <a:ext cx="4426920" cy="3288600"/>
+            <a:ext cx="4426920" cy="3288240"/>
           </a:xfrm>
           <a:prstGeom prst="rect">
             <a:avLst/>
@@ -2681,18 +2517,15 @@
             <a:normAutofit/>
           </a:bodyPr>
           <a:p>
-            <a:endParaRPr b="0" lang="en-US" sz="2000" spc="-1" strike="noStrike">
-              <a:solidFill>
-                <a:srgbClr val="404040"/>
-              </a:solidFill>
-              <a:latin typeface="Calibri"/>
-            </a:endParaRPr>
-          </a:p>
-        </p:txBody>
-      </p:sp>
-      <p:sp>
-        <p:nvSpPr>
-          <p:cNvPr id="23" name="PlaceHolder 3"/>
+            <a:endParaRPr b="0" lang="en-IN" sz="3200" spc="-1" strike="noStrike">
+              <a:latin typeface="Arial"/>
+            </a:endParaRPr>
+          </a:p>
+        </p:txBody>
+      </p:sp>
+      <p:sp>
+        <p:nvSpPr>
+          <p:cNvPr id="20" name="PlaceHolder 3"/>
           <p:cNvSpPr>
             <a:spLocks noGrp="1"/>
           </p:cNvSpPr>
@@ -2703,7 +2536,7 @@
         <p:spPr>
           <a:xfrm>
             <a:off x="5152680" y="1326600"/>
-            <a:ext cx="4426920" cy="1568520"/>
+            <a:ext cx="4426920" cy="1568160"/>
           </a:xfrm>
           <a:prstGeom prst="rect">
             <a:avLst/>
@@ -2714,18 +2547,15 @@
             <a:normAutofit/>
           </a:bodyPr>
           <a:p>
-            <a:endParaRPr b="0" lang="en-US" sz="2000" spc="-1" strike="noStrike">
-              <a:solidFill>
-                <a:srgbClr val="404040"/>
-              </a:solidFill>
-              <a:latin typeface="Calibri"/>
-            </a:endParaRPr>
-          </a:p>
-        </p:txBody>
-      </p:sp>
-      <p:sp>
-        <p:nvSpPr>
-          <p:cNvPr id="24" name="PlaceHolder 4"/>
+            <a:endParaRPr b="0" lang="en-IN" sz="3200" spc="-1" strike="noStrike">
+              <a:latin typeface="Arial"/>
+            </a:endParaRPr>
+          </a:p>
+        </p:txBody>
+      </p:sp>
+      <p:sp>
+        <p:nvSpPr>
+          <p:cNvPr id="21" name="PlaceHolder 4"/>
           <p:cNvSpPr>
             <a:spLocks noGrp="1"/>
           </p:cNvSpPr>
@@ -2735,8 +2565,8 @@
         </p:nvSpPr>
         <p:spPr>
           <a:xfrm>
-            <a:off x="5152680" y="3044520"/>
-            <a:ext cx="4426920" cy="1568520"/>
+            <a:off x="5152680" y="3044160"/>
+            <a:ext cx="4426920" cy="1568160"/>
           </a:xfrm>
           <a:prstGeom prst="rect">
             <a:avLst/>
@@ -2747,11 +2577,8 @@
             <a:normAutofit/>
           </a:bodyPr>
           <a:p>
-            <a:endParaRPr b="0" lang="en-US" sz="2000" spc="-1" strike="noStrike">
-              <a:solidFill>
-                <a:srgbClr val="404040"/>
-              </a:solidFill>
-              <a:latin typeface="Calibri"/>
+            <a:endParaRPr b="0" lang="en-IN" sz="3200" spc="-1" strike="noStrike">
+              <a:latin typeface="Arial"/>
             </a:endParaRPr>
           </a:p>
         </p:txBody>
@@ -2780,7 +2607,7 @@
       </p:grpSpPr>
       <p:sp>
         <p:nvSpPr>
-          <p:cNvPr id="25" name="PlaceHolder 1"/>
+          <p:cNvPr id="22" name="PlaceHolder 1"/>
           <p:cNvSpPr>
             <a:spLocks noGrp="1"/>
           </p:cNvSpPr>
@@ -2791,7 +2618,7 @@
         <p:spPr>
           <a:xfrm>
             <a:off x="504000" y="226080"/>
-            <a:ext cx="9070920" cy="945720"/>
+            <a:ext cx="9070560" cy="945360"/>
           </a:xfrm>
           <a:prstGeom prst="rect">
             <a:avLst/>
@@ -2802,18 +2629,16 @@
             <a:noAutofit/>
           </a:bodyPr>
           <a:p>
-            <a:endParaRPr b="0" lang="en-US" sz="1800" spc="-1" strike="noStrike">
-              <a:solidFill>
-                <a:srgbClr val="000000"/>
-              </a:solidFill>
-              <a:latin typeface="Calibri"/>
-            </a:endParaRPr>
-          </a:p>
-        </p:txBody>
-      </p:sp>
-      <p:sp>
-        <p:nvSpPr>
-          <p:cNvPr id="26" name="PlaceHolder 2"/>
+            <a:pPr algn="ctr"/>
+            <a:endParaRPr b="0" lang="en-IN" sz="4400" spc="-1" strike="noStrike">
+              <a:latin typeface="Arial"/>
+            </a:endParaRPr>
+          </a:p>
+        </p:txBody>
+      </p:sp>
+      <p:sp>
+        <p:nvSpPr>
+          <p:cNvPr id="23" name="PlaceHolder 2"/>
           <p:cNvSpPr>
             <a:spLocks noGrp="1"/>
           </p:cNvSpPr>
@@ -2824,7 +2649,7 @@
         <p:spPr>
           <a:xfrm>
             <a:off x="504000" y="1326600"/>
-            <a:ext cx="4426920" cy="1568520"/>
+            <a:ext cx="4426920" cy="1568160"/>
           </a:xfrm>
           <a:prstGeom prst="rect">
             <a:avLst/>
@@ -2835,18 +2660,15 @@
             <a:normAutofit/>
           </a:bodyPr>
           <a:p>
-            <a:endParaRPr b="0" lang="en-US" sz="2000" spc="-1" strike="noStrike">
-              <a:solidFill>
-                <a:srgbClr val="404040"/>
-              </a:solidFill>
-              <a:latin typeface="Calibri"/>
-            </a:endParaRPr>
-          </a:p>
-        </p:txBody>
-      </p:sp>
-      <p:sp>
-        <p:nvSpPr>
-          <p:cNvPr id="27" name="PlaceHolder 3"/>
+            <a:endParaRPr b="0" lang="en-IN" sz="3200" spc="-1" strike="noStrike">
+              <a:latin typeface="Arial"/>
+            </a:endParaRPr>
+          </a:p>
+        </p:txBody>
+      </p:sp>
+      <p:sp>
+        <p:nvSpPr>
+          <p:cNvPr id="24" name="PlaceHolder 3"/>
           <p:cNvSpPr>
             <a:spLocks noGrp="1"/>
           </p:cNvSpPr>
@@ -2857,7 +2679,7 @@
         <p:spPr>
           <a:xfrm>
             <a:off x="5152680" y="1326600"/>
-            <a:ext cx="4426920" cy="1568520"/>
+            <a:ext cx="4426920" cy="1568160"/>
           </a:xfrm>
           <a:prstGeom prst="rect">
             <a:avLst/>
@@ -2868,18 +2690,15 @@
             <a:normAutofit/>
           </a:bodyPr>
           <a:p>
-            <a:endParaRPr b="0" lang="en-US" sz="2000" spc="-1" strike="noStrike">
-              <a:solidFill>
-                <a:srgbClr val="404040"/>
-              </a:solidFill>
-              <a:latin typeface="Calibri"/>
-            </a:endParaRPr>
-          </a:p>
-        </p:txBody>
-      </p:sp>
-      <p:sp>
-        <p:nvSpPr>
-          <p:cNvPr id="28" name="PlaceHolder 4"/>
+            <a:endParaRPr b="0" lang="en-IN" sz="3200" spc="-1" strike="noStrike">
+              <a:latin typeface="Arial"/>
+            </a:endParaRPr>
+          </a:p>
+        </p:txBody>
+      </p:sp>
+      <p:sp>
+        <p:nvSpPr>
+          <p:cNvPr id="25" name="PlaceHolder 4"/>
           <p:cNvSpPr>
             <a:spLocks noGrp="1"/>
           </p:cNvSpPr>
@@ -2889,8 +2708,8 @@
         </p:nvSpPr>
         <p:spPr>
           <a:xfrm>
-            <a:off x="504000" y="3044520"/>
-            <a:ext cx="9072000" cy="1568520"/>
+            <a:off x="504000" y="3044160"/>
+            <a:ext cx="9071640" cy="1568160"/>
           </a:xfrm>
           <a:prstGeom prst="rect">
             <a:avLst/>
@@ -2901,11 +2720,8 @@
             <a:normAutofit/>
           </a:bodyPr>
           <a:p>
-            <a:endParaRPr b="0" lang="en-US" sz="2000" spc="-1" strike="noStrike">
-              <a:solidFill>
-                <a:srgbClr val="404040"/>
-              </a:solidFill>
-              <a:latin typeface="Calibri"/>
+            <a:endParaRPr b="0" lang="en-IN" sz="3200" spc="-1" strike="noStrike">
+              <a:latin typeface="Arial"/>
             </a:endParaRPr>
           </a:p>
         </p:txBody>
@@ -2948,7 +2764,7 @@
         <p:spPr>
           <a:xfrm>
             <a:off x="2520" y="5292360"/>
-            <a:ext cx="10077480" cy="377640"/>
+            <a:ext cx="10077120" cy="377280"/>
           </a:xfrm>
           <a:prstGeom prst="rect">
             <a:avLst/>
@@ -2984,7 +2800,7 @@
         <p:spPr>
           <a:xfrm>
             <a:off x="0" y="5237640"/>
-            <a:ext cx="10077480" cy="52560"/>
+            <a:ext cx="10077120" cy="52200"/>
           </a:xfrm>
           <a:prstGeom prst="rect">
             <a:avLst/>
@@ -3060,37 +2876,27 @@
         </p:nvSpPr>
         <p:spPr>
           <a:xfrm>
-            <a:off x="907200" y="236880"/>
-            <a:ext cx="8316000" cy="1199160"/>
-          </a:xfrm>
-          <a:prstGeom prst="rect">
-            <a:avLst/>
-          </a:prstGeom>
-        </p:spPr>
-        <p:txBody>
-          <a:bodyPr anchor="b">
+            <a:off x="504000" y="226080"/>
+            <a:ext cx="9070560" cy="945360"/>
+          </a:xfrm>
+          <a:prstGeom prst="rect">
+            <a:avLst/>
+          </a:prstGeom>
+        </p:spPr>
+        <p:txBody>
+          <a:bodyPr lIns="0" rIns="0" tIns="0" bIns="0" anchor="ctr">
             <a:noAutofit/>
           </a:bodyPr>
           <a:p>
-            <a:pPr>
-              <a:lnSpc>
-                <a:spcPct val="85000"/>
-              </a:lnSpc>
-            </a:pPr>
+            <a:pPr algn="ctr"/>
             <a:r>
-              <a:rPr b="0" lang="en-US" sz="4800" spc="-52" strike="noStrike">
-                <a:solidFill>
-                  <a:srgbClr val="404040"/>
-                </a:solidFill>
-                <a:latin typeface="Calibri Light"/>
+              <a:rPr b="0" lang="en-IN" sz="1800" spc="-1" strike="noStrike">
+                <a:latin typeface="Arial"/>
               </a:rPr>
-              <a:t>Click to edit Master title style</a:t>
+              <a:t>Click to edit the title text format</a:t>
             </a:r>
-            <a:endParaRPr b="0" lang="en-US" sz="4800" spc="-1" strike="noStrike">
-              <a:solidFill>
-                <a:srgbClr val="000000"/>
-              </a:solidFill>
-              <a:latin typeface="Calibri"/>
+            <a:endParaRPr b="0" lang="en-IN" sz="1800" spc="-1" strike="noStrike">
+              <a:latin typeface="Arial"/>
             </a:endParaRPr>
           </a:p>
         </p:txBody>
@@ -3098,124 +2904,6 @@
       <p:sp>
         <p:nvSpPr>
           <p:cNvPr id="4" name="PlaceHolder 5"/>
-          <p:cNvSpPr>
-            <a:spLocks noGrp="1"/>
-          </p:cNvSpPr>
-          <p:nvPr>
-            <p:ph type="dt"/>
-          </p:nvPr>
-        </p:nvSpPr>
-        <p:spPr>
-          <a:xfrm>
-            <a:off x="907200" y="5341320"/>
-            <a:ext cx="2043720" cy="301680"/>
-          </a:xfrm>
-          <a:prstGeom prst="rect">
-            <a:avLst/>
-          </a:prstGeom>
-        </p:spPr>
-        <p:txBody>
-          <a:bodyPr anchor="ctr">
-            <a:noAutofit/>
-          </a:bodyPr>
-          <a:p>
-            <a:pPr>
-              <a:lnSpc>
-                <a:spcPct val="100000"/>
-              </a:lnSpc>
-            </a:pPr>
-            <a:fld id="{5388B75E-055E-4081-B68B-DB3C89DA4F15}" type="datetime">
-              <a:rPr b="0" lang="en-US" sz="1600" spc="-1" strike="noStrike">
-                <a:solidFill>
-                  <a:srgbClr val="ffffff"/>
-                </a:solidFill>
-                <a:latin typeface="Calibri"/>
-              </a:rPr>
-              <a:t>4/24/21</a:t>
-            </a:fld>
-            <a:endParaRPr b="0" lang="en-IN" sz="1600" spc="-1" strike="noStrike">
-              <a:latin typeface="Times New Roman"/>
-            </a:endParaRPr>
-          </a:p>
-        </p:txBody>
-      </p:sp>
-      <p:sp>
-        <p:nvSpPr>
-          <p:cNvPr id="5" name="PlaceHolder 6"/>
-          <p:cNvSpPr>
-            <a:spLocks noGrp="1"/>
-          </p:cNvSpPr>
-          <p:nvPr>
-            <p:ph type="ftr"/>
-          </p:nvPr>
-        </p:nvSpPr>
-        <p:spPr>
-          <a:xfrm>
-            <a:off x="3047760" y="5341320"/>
-            <a:ext cx="3987360" cy="301680"/>
-          </a:xfrm>
-          <a:prstGeom prst="rect">
-            <a:avLst/>
-          </a:prstGeom>
-        </p:spPr>
-        <p:txBody>
-          <a:bodyPr anchor="ctr">
-            <a:noAutofit/>
-          </a:bodyPr>
-          <a:p>
-            <a:endParaRPr b="0" lang="en-IN" sz="2400" spc="-1" strike="noStrike">
-              <a:latin typeface="Times New Roman"/>
-            </a:endParaRPr>
-          </a:p>
-        </p:txBody>
-      </p:sp>
-      <p:sp>
-        <p:nvSpPr>
-          <p:cNvPr id="6" name="PlaceHolder 7"/>
-          <p:cNvSpPr>
-            <a:spLocks noGrp="1"/>
-          </p:cNvSpPr>
-          <p:nvPr>
-            <p:ph type="sldNum"/>
-          </p:nvPr>
-        </p:nvSpPr>
-        <p:spPr>
-          <a:xfrm>
-            <a:off x="8186040" y="5341320"/>
-            <a:ext cx="1084320" cy="301680"/>
-          </a:xfrm>
-          <a:prstGeom prst="rect">
-            <a:avLst/>
-          </a:prstGeom>
-        </p:spPr>
-        <p:txBody>
-          <a:bodyPr anchor="ctr">
-            <a:noAutofit/>
-          </a:bodyPr>
-          <a:p>
-            <a:pPr algn="r">
-              <a:lnSpc>
-                <a:spcPct val="100000"/>
-              </a:lnSpc>
-            </a:pPr>
-            <a:fld id="{3D5A7539-3493-4FFD-8C87-BE2CAE8DE68F}" type="slidenum">
-              <a:rPr b="0" lang="en-US" sz="1870" spc="-1" strike="noStrike">
-                <a:solidFill>
-                  <a:srgbClr val="ffffff"/>
-                </a:solidFill>
-                <a:latin typeface="Calibri"/>
-              </a:rPr>
-              <a:t>&lt;number&gt;</a:t>
-            </a:fld>
-            <a:endParaRPr b="0" lang="en-IN" sz="1870" spc="-1" strike="noStrike">
-              <a:latin typeface="Times New Roman"/>
-            </a:endParaRPr>
-          </a:p>
-        </p:txBody>
-      </p:sp>
-      <p:sp>
-        <p:nvSpPr>
-          <p:cNvPr id="7" name="PlaceHolder 8"/>
           <p:cNvSpPr>
             <a:spLocks noGrp="1"/>
           </p:cNvSpPr>
@@ -3249,19 +2937,13 @@
               <a:buChar char=""/>
             </a:pPr>
             <a:r>
-              <a:rPr b="0" lang="en-US" sz="2000" spc="-1" strike="noStrike">
-                <a:solidFill>
-                  <a:srgbClr val="404040"/>
-                </a:solidFill>
-                <a:latin typeface="Calibri"/>
+              <a:rPr b="0" lang="en-IN" sz="3200" spc="-1" strike="noStrike">
+                <a:latin typeface="Arial"/>
               </a:rPr>
               <a:t>Click to edit the outline text format</a:t>
             </a:r>
-            <a:endParaRPr b="0" lang="en-US" sz="2000" spc="-1" strike="noStrike">
-              <a:solidFill>
-                <a:srgbClr val="404040"/>
-              </a:solidFill>
-              <a:latin typeface="Calibri"/>
+            <a:endParaRPr b="0" lang="en-IN" sz="3200" spc="-1" strike="noStrike">
+              <a:latin typeface="Arial"/>
             </a:endParaRPr>
           </a:p>
           <a:p>
@@ -3277,19 +2959,13 @@
               <a:buChar char=""/>
             </a:pPr>
             <a:r>
-              <a:rPr b="0" lang="en-US" sz="1400" spc="-1" strike="noStrike">
-                <a:solidFill>
-                  <a:srgbClr val="404040"/>
-                </a:solidFill>
-                <a:latin typeface="Calibri"/>
+              <a:rPr b="0" lang="en-IN" sz="2800" spc="-1" strike="noStrike">
+                <a:latin typeface="Arial"/>
               </a:rPr>
               <a:t>Second Outline Level</a:t>
             </a:r>
-            <a:endParaRPr b="0" lang="en-US" sz="1400" spc="-1" strike="noStrike">
-              <a:solidFill>
-                <a:srgbClr val="404040"/>
-              </a:solidFill>
-              <a:latin typeface="Calibri"/>
+            <a:endParaRPr b="0" lang="en-IN" sz="2800" spc="-1" strike="noStrike">
+              <a:latin typeface="Arial"/>
             </a:endParaRPr>
           </a:p>
           <a:p>
@@ -3305,19 +2981,13 @@
               <a:buChar char=""/>
             </a:pPr>
             <a:r>
-              <a:rPr b="0" lang="en-US" sz="1400" spc="-1" strike="noStrike">
-                <a:solidFill>
-                  <a:srgbClr val="404040"/>
-                </a:solidFill>
-                <a:latin typeface="Calibri"/>
+              <a:rPr b="0" lang="en-IN" sz="2400" spc="-1" strike="noStrike">
+                <a:latin typeface="Arial"/>
               </a:rPr>
               <a:t>Third Outline Level</a:t>
             </a:r>
-            <a:endParaRPr b="0" lang="en-US" sz="1400" spc="-1" strike="noStrike">
-              <a:solidFill>
-                <a:srgbClr val="404040"/>
-              </a:solidFill>
-              <a:latin typeface="Calibri"/>
+            <a:endParaRPr b="0" lang="en-IN" sz="2400" spc="-1" strike="noStrike">
+              <a:latin typeface="Arial"/>
             </a:endParaRPr>
           </a:p>
           <a:p>
@@ -3333,19 +3003,13 @@
               <a:buChar char=""/>
             </a:pPr>
             <a:r>
-              <a:rPr b="0" lang="en-US" sz="1400" spc="-1" strike="noStrike">
-                <a:solidFill>
-                  <a:srgbClr val="404040"/>
-                </a:solidFill>
-                <a:latin typeface="Calibri"/>
+              <a:rPr b="0" lang="en-IN" sz="2000" spc="-1" strike="noStrike">
+                <a:latin typeface="Arial"/>
               </a:rPr>
               <a:t>Fourth Outline Level</a:t>
             </a:r>
-            <a:endParaRPr b="0" lang="en-US" sz="1400" spc="-1" strike="noStrike">
-              <a:solidFill>
-                <a:srgbClr val="404040"/>
-              </a:solidFill>
-              <a:latin typeface="Calibri"/>
+            <a:endParaRPr b="0" lang="en-IN" sz="2000" spc="-1" strike="noStrike">
+              <a:latin typeface="Arial"/>
             </a:endParaRPr>
           </a:p>
           <a:p>
@@ -3361,19 +3025,13 @@
               <a:buChar char=""/>
             </a:pPr>
             <a:r>
-              <a:rPr b="0" lang="en-US" sz="2000" spc="-1" strike="noStrike">
-                <a:solidFill>
-                  <a:srgbClr val="404040"/>
-                </a:solidFill>
-                <a:latin typeface="Calibri"/>
+              <a:rPr b="0" lang="en-IN" sz="2000" spc="-1" strike="noStrike">
+                <a:latin typeface="Arial"/>
               </a:rPr>
               <a:t>Fifth Outline Level</a:t>
             </a:r>
-            <a:endParaRPr b="0" lang="en-US" sz="2000" spc="-1" strike="noStrike">
-              <a:solidFill>
-                <a:srgbClr val="404040"/>
-              </a:solidFill>
-              <a:latin typeface="Calibri"/>
+            <a:endParaRPr b="0" lang="en-IN" sz="2000" spc="-1" strike="noStrike">
+              <a:latin typeface="Arial"/>
             </a:endParaRPr>
           </a:p>
           <a:p>
@@ -3389,19 +3047,13 @@
               <a:buChar char=""/>
             </a:pPr>
             <a:r>
-              <a:rPr b="0" lang="en-US" sz="2000" spc="-1" strike="noStrike">
-                <a:solidFill>
-                  <a:srgbClr val="404040"/>
-                </a:solidFill>
-                <a:latin typeface="Calibri"/>
+              <a:rPr b="0" lang="en-IN" sz="2000" spc="-1" strike="noStrike">
+                <a:latin typeface="Arial"/>
               </a:rPr>
               <a:t>Sixth Outline Level</a:t>
             </a:r>
-            <a:endParaRPr b="0" lang="en-US" sz="2000" spc="-1" strike="noStrike">
-              <a:solidFill>
-                <a:srgbClr val="404040"/>
-              </a:solidFill>
-              <a:latin typeface="Calibri"/>
+            <a:endParaRPr b="0" lang="en-IN" sz="2000" spc="-1" strike="noStrike">
+              <a:latin typeface="Arial"/>
             </a:endParaRPr>
           </a:p>
           <a:p>
@@ -3417,19 +3069,13 @@
               <a:buChar char=""/>
             </a:pPr>
             <a:r>
-              <a:rPr b="0" lang="en-US" sz="2000" spc="-1" strike="noStrike">
-                <a:solidFill>
-                  <a:srgbClr val="404040"/>
-                </a:solidFill>
-                <a:latin typeface="Calibri"/>
+              <a:rPr b="0" lang="en-IN" sz="2000" spc="-1" strike="noStrike">
+                <a:latin typeface="Arial"/>
               </a:rPr>
               <a:t>Seventh Outline Level</a:t>
             </a:r>
-            <a:endParaRPr b="0" lang="en-US" sz="2000" spc="-1" strike="noStrike">
-              <a:solidFill>
-                <a:srgbClr val="404040"/>
-              </a:solidFill>
-              <a:latin typeface="Calibri"/>
+            <a:endParaRPr b="0" lang="en-IN" sz="2000" spc="-1" strike="noStrike">
+              <a:latin typeface="Arial"/>
             </a:endParaRPr>
           </a:p>
         </p:txBody>
@@ -3480,14 +3126,14 @@
       </p:grpSpPr>
       <p:sp>
         <p:nvSpPr>
-          <p:cNvPr id="44" name="CustomShape 1"/>
+          <p:cNvPr id="41" name="CustomShape 1"/>
           <p:cNvSpPr/>
           <p:nvPr/>
         </p:nvSpPr>
         <p:spPr>
           <a:xfrm>
             <a:off x="2520" y="5292360"/>
-            <a:ext cx="10077480" cy="377640"/>
+            <a:ext cx="10077120" cy="377280"/>
           </a:xfrm>
           <a:prstGeom prst="rect">
             <a:avLst/>
@@ -3516,14 +3162,14 @@
       </p:sp>
       <p:sp>
         <p:nvSpPr>
-          <p:cNvPr id="45" name="CustomShape 2"/>
+          <p:cNvPr id="42" name="CustomShape 2"/>
           <p:cNvSpPr/>
           <p:nvPr/>
         </p:nvSpPr>
         <p:spPr>
           <a:xfrm>
             <a:off x="0" y="5237640"/>
-            <a:ext cx="10077480" cy="52560"/>
+            <a:ext cx="10077120" cy="52200"/>
           </a:xfrm>
           <a:prstGeom prst="rect">
             <a:avLst/>
@@ -3552,7 +3198,7 @@
       </p:sp>
       <p:sp>
         <p:nvSpPr>
-          <p:cNvPr id="46" name="Line 3"/>
+          <p:cNvPr id="43" name="Line 3"/>
           <p:cNvSpPr/>
           <p:nvPr/>
         </p:nvSpPr>
@@ -3589,7 +3235,7 @@
       </p:sp>
       <p:sp>
         <p:nvSpPr>
-          <p:cNvPr id="47" name="PlaceHolder 4"/>
+          <p:cNvPr id="44" name="PlaceHolder 4"/>
           <p:cNvSpPr>
             <a:spLocks noGrp="1"/>
           </p:cNvSpPr>
@@ -3600,7 +3246,7 @@
         <p:spPr>
           <a:xfrm>
             <a:off x="504000" y="226080"/>
-            <a:ext cx="9070920" cy="945720"/>
+            <a:ext cx="9070560" cy="945360"/>
           </a:xfrm>
           <a:prstGeom prst="rect">
             <a:avLst/>
@@ -3613,26 +3259,20 @@
           <a:p>
             <a:pPr algn="ctr"/>
             <a:r>
-              <a:rPr b="0" lang="en-US" sz="4800" spc="-1" strike="noStrike">
-                <a:solidFill>
-                  <a:srgbClr val="000000"/>
-                </a:solidFill>
-                <a:latin typeface="Calibri"/>
+              <a:rPr b="0" lang="en-IN" sz="1800" spc="-1" strike="noStrike">
+                <a:latin typeface="Arial"/>
               </a:rPr>
               <a:t>Click to edit the title text format</a:t>
             </a:r>
-            <a:endParaRPr b="0" lang="en-US" sz="4800" spc="-1" strike="noStrike">
-              <a:solidFill>
-                <a:srgbClr val="000000"/>
-              </a:solidFill>
-              <a:latin typeface="Calibri"/>
-            </a:endParaRPr>
-          </a:p>
-        </p:txBody>
-      </p:sp>
-      <p:sp>
-        <p:nvSpPr>
-          <p:cNvPr id="48" name="PlaceHolder 5"/>
+            <a:endParaRPr b="0" lang="en-IN" sz="1800" spc="-1" strike="noStrike">
+              <a:latin typeface="Arial"/>
+            </a:endParaRPr>
+          </a:p>
+        </p:txBody>
+      </p:sp>
+      <p:sp>
+        <p:nvSpPr>
+          <p:cNvPr id="45" name="PlaceHolder 5"/>
           <p:cNvSpPr>
             <a:spLocks noGrp="1"/>
           </p:cNvSpPr>
@@ -3643,7 +3283,7 @@
         <p:spPr>
           <a:xfrm>
             <a:off x="504000" y="1326600"/>
-            <a:ext cx="9072000" cy="3288600"/>
+            <a:ext cx="9071640" cy="3288240"/>
           </a:xfrm>
           <a:prstGeom prst="rect">
             <a:avLst/>
@@ -3654,7 +3294,7 @@
             <a:normAutofit/>
           </a:bodyPr>
           <a:p>
-            <a:pPr marL="432000" indent="-324000">
+            <a:pPr marL="432000" indent="-324000" algn="ctr">
               <a:spcBef>
                 <a:spcPts val="1417"/>
               </a:spcBef>
@@ -3666,23 +3306,17 @@
               <a:buChar char=""/>
             </a:pPr>
             <a:r>
-              <a:rPr b="0" lang="en-US" sz="2000" spc="-1" strike="noStrike">
-                <a:solidFill>
-                  <a:srgbClr val="404040"/>
-                </a:solidFill>
-                <a:latin typeface="Calibri"/>
+              <a:rPr b="0" lang="en-IN" sz="1800" spc="-1" strike="noStrike">
+                <a:latin typeface="Arial"/>
               </a:rPr>
               <a:t>Click to edit the outline text format</a:t>
             </a:r>
-            <a:endParaRPr b="0" lang="en-US" sz="2000" spc="-1" strike="noStrike">
-              <a:solidFill>
-                <a:srgbClr val="404040"/>
-              </a:solidFill>
-              <a:latin typeface="Calibri"/>
-            </a:endParaRPr>
-          </a:p>
-          <a:p>
-            <a:pPr lvl="1" marL="864000" indent="-324000">
+            <a:endParaRPr b="0" lang="en-IN" sz="1800" spc="-1" strike="noStrike">
+              <a:latin typeface="Arial"/>
+            </a:endParaRPr>
+          </a:p>
+          <a:p>
+            <a:pPr lvl="1" marL="864000" indent="-324000" algn="ctr">
               <a:spcBef>
                 <a:spcPts val="1134"/>
               </a:spcBef>
@@ -3694,23 +3328,17 @@
               <a:buChar char=""/>
             </a:pPr>
             <a:r>
-              <a:rPr b="0" lang="en-US" sz="1400" spc="-1" strike="noStrike">
-                <a:solidFill>
-                  <a:srgbClr val="404040"/>
-                </a:solidFill>
-                <a:latin typeface="Calibri"/>
+              <a:rPr b="0" lang="en-IN" sz="1800" spc="-1" strike="noStrike">
+                <a:latin typeface="Arial"/>
               </a:rPr>
               <a:t>Second Outline Level</a:t>
             </a:r>
-            <a:endParaRPr b="0" lang="en-US" sz="1400" spc="-1" strike="noStrike">
-              <a:solidFill>
-                <a:srgbClr val="404040"/>
-              </a:solidFill>
-              <a:latin typeface="Calibri"/>
-            </a:endParaRPr>
-          </a:p>
-          <a:p>
-            <a:pPr lvl="2" marL="1296000" indent="-288000">
+            <a:endParaRPr b="0" lang="en-IN" sz="1800" spc="-1" strike="noStrike">
+              <a:latin typeface="Arial"/>
+            </a:endParaRPr>
+          </a:p>
+          <a:p>
+            <a:pPr lvl="2" marL="1296000" indent="-288000" algn="ctr">
               <a:spcBef>
                 <a:spcPts val="850"/>
               </a:spcBef>
@@ -3722,23 +3350,17 @@
               <a:buChar char=""/>
             </a:pPr>
             <a:r>
-              <a:rPr b="0" lang="en-US" sz="1400" spc="-1" strike="noStrike">
-                <a:solidFill>
-                  <a:srgbClr val="404040"/>
-                </a:solidFill>
-                <a:latin typeface="Calibri"/>
+              <a:rPr b="0" lang="en-IN" sz="1800" spc="-1" strike="noStrike">
+                <a:latin typeface="Arial"/>
               </a:rPr>
               <a:t>Third Outline Level</a:t>
             </a:r>
-            <a:endParaRPr b="0" lang="en-US" sz="1400" spc="-1" strike="noStrike">
-              <a:solidFill>
-                <a:srgbClr val="404040"/>
-              </a:solidFill>
-              <a:latin typeface="Calibri"/>
-            </a:endParaRPr>
-          </a:p>
-          <a:p>
-            <a:pPr lvl="3" marL="1728000" indent="-216000">
+            <a:endParaRPr b="0" lang="en-IN" sz="1800" spc="-1" strike="noStrike">
+              <a:latin typeface="Arial"/>
+            </a:endParaRPr>
+          </a:p>
+          <a:p>
+            <a:pPr lvl="3" marL="1728000" indent="-216000" algn="ctr">
               <a:spcBef>
                 <a:spcPts val="567"/>
               </a:spcBef>
@@ -3750,23 +3372,17 @@
               <a:buChar char=""/>
             </a:pPr>
             <a:r>
-              <a:rPr b="0" lang="en-US" sz="1400" spc="-1" strike="noStrike">
-                <a:solidFill>
-                  <a:srgbClr val="404040"/>
-                </a:solidFill>
-                <a:latin typeface="Calibri"/>
+              <a:rPr b="0" lang="en-IN" sz="1800" spc="-1" strike="noStrike">
+                <a:latin typeface="Arial"/>
               </a:rPr>
               <a:t>Fourth Outline Level</a:t>
             </a:r>
-            <a:endParaRPr b="0" lang="en-US" sz="1400" spc="-1" strike="noStrike">
-              <a:solidFill>
-                <a:srgbClr val="404040"/>
-              </a:solidFill>
-              <a:latin typeface="Calibri"/>
-            </a:endParaRPr>
-          </a:p>
-          <a:p>
-            <a:pPr lvl="4" marL="2160000" indent="-216000">
+            <a:endParaRPr b="0" lang="en-IN" sz="1800" spc="-1" strike="noStrike">
+              <a:latin typeface="Arial"/>
+            </a:endParaRPr>
+          </a:p>
+          <a:p>
+            <a:pPr lvl="4" marL="2160000" indent="-216000" algn="ctr">
               <a:spcBef>
                 <a:spcPts val="283"/>
               </a:spcBef>
@@ -3778,23 +3394,17 @@
               <a:buChar char=""/>
             </a:pPr>
             <a:r>
-              <a:rPr b="0" lang="en-US" sz="2000" spc="-1" strike="noStrike">
-                <a:solidFill>
-                  <a:srgbClr val="404040"/>
-                </a:solidFill>
-                <a:latin typeface="Calibri"/>
+              <a:rPr b="0" lang="en-IN" sz="1800" spc="-1" strike="noStrike">
+                <a:latin typeface="Arial"/>
               </a:rPr>
               <a:t>Fifth Outline Level</a:t>
             </a:r>
-            <a:endParaRPr b="0" lang="en-US" sz="2000" spc="-1" strike="noStrike">
-              <a:solidFill>
-                <a:srgbClr val="404040"/>
-              </a:solidFill>
-              <a:latin typeface="Calibri"/>
-            </a:endParaRPr>
-          </a:p>
-          <a:p>
-            <a:pPr lvl="5" marL="2592000" indent="-216000">
+            <a:endParaRPr b="0" lang="en-IN" sz="1800" spc="-1" strike="noStrike">
+              <a:latin typeface="Arial"/>
+            </a:endParaRPr>
+          </a:p>
+          <a:p>
+            <a:pPr lvl="5" marL="2592000" indent="-216000" algn="ctr">
               <a:spcBef>
                 <a:spcPts val="283"/>
               </a:spcBef>
@@ -3806,23 +3416,17 @@
               <a:buChar char=""/>
             </a:pPr>
             <a:r>
-              <a:rPr b="0" lang="en-US" sz="2000" spc="-1" strike="noStrike">
-                <a:solidFill>
-                  <a:srgbClr val="404040"/>
-                </a:solidFill>
-                <a:latin typeface="Calibri"/>
+              <a:rPr b="0" lang="en-IN" sz="1800" spc="-1" strike="noStrike">
+                <a:latin typeface="Arial"/>
               </a:rPr>
               <a:t>Sixth Outline Level</a:t>
             </a:r>
-            <a:endParaRPr b="0" lang="en-US" sz="2000" spc="-1" strike="noStrike">
-              <a:solidFill>
-                <a:srgbClr val="404040"/>
-              </a:solidFill>
-              <a:latin typeface="Calibri"/>
-            </a:endParaRPr>
-          </a:p>
-          <a:p>
-            <a:pPr lvl="6" marL="3024000" indent="-216000">
+            <a:endParaRPr b="0" lang="en-IN" sz="1800" spc="-1" strike="noStrike">
+              <a:latin typeface="Arial"/>
+            </a:endParaRPr>
+          </a:p>
+          <a:p>
+            <a:pPr lvl="6" marL="3024000" indent="-216000" algn="ctr">
               <a:spcBef>
                 <a:spcPts val="283"/>
               </a:spcBef>
@@ -3834,19 +3438,13 @@
               <a:buChar char=""/>
             </a:pPr>
             <a:r>
-              <a:rPr b="0" lang="en-US" sz="2000" spc="-1" strike="noStrike">
-                <a:solidFill>
-                  <a:srgbClr val="404040"/>
-                </a:solidFill>
-                <a:latin typeface="Calibri"/>
+              <a:rPr b="0" lang="en-IN" sz="1800" spc="-1" strike="noStrike">
+                <a:latin typeface="Arial"/>
               </a:rPr>
               <a:t>Seventh Outline Level</a:t>
             </a:r>
-            <a:endParaRPr b="0" lang="en-US" sz="2000" spc="-1" strike="noStrike">
-              <a:solidFill>
-                <a:srgbClr val="404040"/>
-              </a:solidFill>
-              <a:latin typeface="Calibri"/>
+            <a:endParaRPr b="0" lang="en-IN" sz="1800" spc="-1" strike="noStrike">
+              <a:latin typeface="Arial"/>
             </a:endParaRPr>
           </a:p>
         </p:txBody>
@@ -3890,14 +3488,14 @@
       </p:grpSpPr>
       <p:sp>
         <p:nvSpPr>
-          <p:cNvPr id="85" name="CustomShape 1"/>
+          <p:cNvPr id="82" name="CustomShape 1"/>
           <p:cNvSpPr/>
           <p:nvPr/>
         </p:nvSpPr>
         <p:spPr>
           <a:xfrm>
             <a:off x="3390840" y="546840"/>
-            <a:ext cx="6184080" cy="624960"/>
+            <a:ext cx="6183720" cy="624600"/>
           </a:xfrm>
           <a:prstGeom prst="rect">
             <a:avLst/>
@@ -3929,6 +3527,7 @@
                   <a:srgbClr val="000000"/>
                 </a:solidFill>
                 <a:latin typeface="Times New Roman"/>
+                <a:ea typeface="DejaVu Sans"/>
               </a:rPr>
               <a:t>Code Innovation Series - Vidyalankar Institute of Technology </a:t>
             </a:r>
@@ -3940,14 +3539,14 @@
       </p:sp>
       <p:sp>
         <p:nvSpPr>
-          <p:cNvPr id="86" name="CustomShape 2"/>
+          <p:cNvPr id="83" name="CustomShape 2"/>
           <p:cNvSpPr/>
           <p:nvPr/>
         </p:nvSpPr>
         <p:spPr>
           <a:xfrm>
             <a:off x="6624000" y="3384000"/>
-            <a:ext cx="3167280" cy="1113480"/>
+            <a:ext cx="3166920" cy="1113120"/>
           </a:xfrm>
           <a:prstGeom prst="rect">
             <a:avLst/>
@@ -3979,6 +3578,7 @@
                   <a:srgbClr val="000000"/>
                 </a:solidFill>
                 <a:latin typeface="Arial"/>
+                <a:ea typeface="DejaVu Sans"/>
               </a:rPr>
               <a:t>Group Memebers:</a:t>
             </a:r>
@@ -3998,6 +3598,7 @@
                   <a:srgbClr val="000000"/>
                 </a:solidFill>
                 <a:latin typeface="Arial"/>
+                <a:ea typeface="DejaVu Sans"/>
               </a:rPr>
               <a:t>Rohana Survase </a:t>
             </a:r>
@@ -4017,6 +3618,7 @@
                   <a:srgbClr val="000000"/>
                 </a:solidFill>
                 <a:latin typeface="Arial"/>
+                <a:ea typeface="DejaVu Sans"/>
               </a:rPr>
               <a:t>Sayali Khamgaonkar</a:t>
             </a:r>
@@ -4036,6 +3638,7 @@
                   <a:srgbClr val="000000"/>
                 </a:solidFill>
                 <a:latin typeface="Arial"/>
+                <a:ea typeface="DejaVu Sans"/>
               </a:rPr>
               <a:t>Shardul Birje</a:t>
             </a:r>
@@ -4047,14 +3650,14 @@
       </p:sp>
       <p:sp>
         <p:nvSpPr>
-          <p:cNvPr id="87" name="CustomShape 3"/>
+          <p:cNvPr id="84" name="CustomShape 3"/>
           <p:cNvSpPr/>
           <p:nvPr/>
         </p:nvSpPr>
         <p:spPr>
           <a:xfrm>
             <a:off x="3647520" y="2657880"/>
-            <a:ext cx="2519280" cy="345600"/>
+            <a:ext cx="2518920" cy="345240"/>
           </a:xfrm>
           <a:prstGeom prst="rect">
             <a:avLst/>
@@ -4086,6 +3689,7 @@
                   <a:srgbClr val="000000"/>
                 </a:solidFill>
                 <a:latin typeface="Arial"/>
+                <a:ea typeface="DejaVu Sans"/>
               </a:rPr>
               <a:t>Category: Education</a:t>
             </a:r>
@@ -4097,7 +3701,7 @@
       </p:sp>
       <p:pic>
         <p:nvPicPr>
-          <p:cNvPr id="88" name="Picture 2" descr="Text&#10;&#10;Description automatically generated"/>
+          <p:cNvPr id="85" name="Picture 2" descr="Text&#10;&#10;Description automatically generated"/>
           <p:cNvPicPr/>
           <p:nvPr/>
         </p:nvPicPr>
@@ -4108,7 +3712,7 @@
         <p:spPr>
           <a:xfrm>
             <a:off x="243720" y="192960"/>
-            <a:ext cx="2742840" cy="1227960"/>
+            <a:ext cx="2742480" cy="1227600"/>
           </a:xfrm>
           <a:prstGeom prst="rect">
             <a:avLst/>
@@ -4120,14 +3724,14 @@
       </p:pic>
       <p:sp>
         <p:nvSpPr>
-          <p:cNvPr id="89" name="CustomShape 4"/>
+          <p:cNvPr id="86" name="CustomShape 4"/>
           <p:cNvSpPr/>
           <p:nvPr/>
         </p:nvSpPr>
         <p:spPr>
           <a:xfrm>
             <a:off x="2650320" y="4867560"/>
-            <a:ext cx="5131080" cy="414360"/>
+            <a:ext cx="5130720" cy="414000"/>
           </a:xfrm>
           <a:prstGeom prst="rect">
             <a:avLst/>
@@ -4159,6 +3763,7 @@
                   <a:srgbClr val="000000"/>
                 </a:solidFill>
                 <a:latin typeface="Arial"/>
+                <a:ea typeface="DejaVu Sans"/>
               </a:rPr>
               <a:t>College: Vidyalankar Institute of Technology</a:t>
             </a:r>
@@ -4170,14 +3775,14 @@
       </p:sp>
       <p:sp>
         <p:nvSpPr>
-          <p:cNvPr id="90" name="CustomShape 5"/>
+          <p:cNvPr id="87" name="CustomShape 5"/>
           <p:cNvSpPr/>
           <p:nvPr/>
         </p:nvSpPr>
         <p:spPr>
           <a:xfrm>
             <a:off x="3700080" y="1759320"/>
-            <a:ext cx="2163960" cy="731880"/>
+            <a:ext cx="2163600" cy="730440"/>
           </a:xfrm>
           <a:prstGeom prst="rect">
             <a:avLst/>
@@ -4194,7 +3799,7 @@
           <a:fontRef idx="minor"/>
         </p:style>
         <p:txBody>
-          <a:bodyPr>
+          <a:bodyPr lIns="90000" rIns="90000" tIns="45000" bIns="45000">
             <a:spAutoFit/>
           </a:bodyPr>
           <a:p>
@@ -4209,6 +3814,7 @@
                   <a:srgbClr val="000000"/>
                 </a:solidFill>
                 <a:latin typeface="Times New Roman"/>
+                <a:ea typeface="DejaVu Sans"/>
               </a:rPr>
               <a:t>UnSkool</a:t>
             </a:r>
@@ -4257,14 +3863,14 @@
       </p:grpSpPr>
       <p:sp>
         <p:nvSpPr>
-          <p:cNvPr id="91" name="CustomShape 1"/>
+          <p:cNvPr id="88" name="CustomShape 1"/>
           <p:cNvSpPr/>
           <p:nvPr/>
         </p:nvSpPr>
         <p:spPr>
           <a:xfrm>
             <a:off x="2520" y="5292360"/>
-            <a:ext cx="10077480" cy="377640"/>
+            <a:ext cx="10077120" cy="377280"/>
           </a:xfrm>
           <a:prstGeom prst="rect">
             <a:avLst/>
@@ -4293,14 +3899,14 @@
       </p:sp>
       <p:sp>
         <p:nvSpPr>
-          <p:cNvPr id="92" name="CustomShape 2"/>
+          <p:cNvPr id="89" name="CustomShape 2"/>
           <p:cNvSpPr/>
           <p:nvPr/>
         </p:nvSpPr>
         <p:spPr>
           <a:xfrm>
             <a:off x="0" y="5237640"/>
-            <a:ext cx="10077480" cy="52560"/>
+            <a:ext cx="10077120" cy="52200"/>
           </a:xfrm>
           <a:prstGeom prst="rect">
             <a:avLst/>
@@ -4329,7 +3935,7 @@
       </p:sp>
       <p:sp>
         <p:nvSpPr>
-          <p:cNvPr id="93" name="Line 3"/>
+          <p:cNvPr id="90" name="Line 3"/>
           <p:cNvSpPr/>
           <p:nvPr/>
         </p:nvSpPr>
@@ -4366,14 +3972,14 @@
       </p:sp>
       <p:sp>
         <p:nvSpPr>
-          <p:cNvPr id="94" name="CustomShape 4"/>
+          <p:cNvPr id="91" name="CustomShape 4"/>
           <p:cNvSpPr/>
           <p:nvPr/>
         </p:nvSpPr>
         <p:spPr>
           <a:xfrm>
             <a:off x="0" y="0"/>
-            <a:ext cx="10080360" cy="5670360"/>
+            <a:ext cx="10080000" cy="5670000"/>
           </a:xfrm>
           <a:prstGeom prst="rect">
             <a:avLst/>
@@ -4402,14 +4008,14 @@
       </p:sp>
       <p:sp>
         <p:nvSpPr>
-          <p:cNvPr id="95" name="CustomShape 5"/>
+          <p:cNvPr id="92" name="CustomShape 5"/>
           <p:cNvSpPr/>
           <p:nvPr/>
         </p:nvSpPr>
         <p:spPr>
           <a:xfrm>
             <a:off x="0" y="0"/>
-            <a:ext cx="10080360" cy="5237280"/>
+            <a:ext cx="10080000" cy="5236920"/>
           </a:xfrm>
           <a:prstGeom prst="rect">
             <a:avLst/>
@@ -4438,14 +4044,14 @@
       </p:sp>
       <p:sp>
         <p:nvSpPr>
-          <p:cNvPr id="96" name="CustomShape 6"/>
+          <p:cNvPr id="93" name="CustomShape 6"/>
           <p:cNvSpPr/>
           <p:nvPr/>
         </p:nvSpPr>
         <p:spPr>
           <a:xfrm>
             <a:off x="4284360" y="524880"/>
-            <a:ext cx="5265000" cy="1199160"/>
+            <a:ext cx="5264640" cy="1198800"/>
           </a:xfrm>
           <a:prstGeom prst="rect">
             <a:avLst/>
@@ -4462,8 +4068,8 @@
           <a:fontRef idx="minor"/>
         </p:style>
         <p:txBody>
-          <a:bodyPr anchor="b">
-            <a:normAutofit fontScale="97000"/>
+          <a:bodyPr lIns="90000" rIns="90000" tIns="45000" bIns="45000" anchor="b">
+            <a:normAutofit/>
           </a:bodyPr>
           <a:p>
             <a:pPr>
@@ -4480,6 +4086,7 @@
                   <a:srgbClr val="655c47"/>
                 </a:solidFill>
                 <a:latin typeface="Calibri Light"/>
+                <a:ea typeface="DejaVu Sans"/>
               </a:rPr>
               <a:t>Problem Statement</a:t>
             </a:r>
@@ -4491,7 +4098,7 @@
       </p:sp>
       <p:pic>
         <p:nvPicPr>
-          <p:cNvPr id="97" name="Picture 57" descr="Exclamation mark on a yellow background"/>
+          <p:cNvPr id="94" name="Picture 57" descr="Exclamation mark on a yellow background"/>
           <p:cNvPicPr/>
           <p:nvPr/>
         </p:nvPicPr>
@@ -4503,7 +4110,7 @@
         <p:spPr>
           <a:xfrm>
             <a:off x="0" y="-10080"/>
-            <a:ext cx="3848040" cy="5680080"/>
+            <a:ext cx="3847680" cy="5679720"/>
           </a:xfrm>
           <a:prstGeom prst="rect">
             <a:avLst/>
@@ -4515,7 +4122,7 @@
       </p:pic>
       <p:sp>
         <p:nvSpPr>
-          <p:cNvPr id="98" name="Line 7"/>
+          <p:cNvPr id="95" name="Line 7"/>
           <p:cNvSpPr/>
           <p:nvPr/>
         </p:nvSpPr>
@@ -4553,14 +4160,14 @@
       </p:sp>
       <p:sp>
         <p:nvSpPr>
-          <p:cNvPr id="99" name="CustomShape 8"/>
+          <p:cNvPr id="96" name="CustomShape 8"/>
           <p:cNvSpPr/>
           <p:nvPr/>
         </p:nvSpPr>
         <p:spPr>
           <a:xfrm>
             <a:off x="4284360" y="1782360"/>
-            <a:ext cx="5265000" cy="1964520"/>
+            <a:ext cx="5264640" cy="1964160"/>
           </a:xfrm>
           <a:prstGeom prst="rect">
             <a:avLst/>
@@ -4577,7 +4184,7 @@
           <a:fontRef idx="minor"/>
         </p:style>
         <p:txBody>
-          <a:bodyPr lIns="0" rIns="0">
+          <a:bodyPr lIns="0" rIns="0" tIns="45000" bIns="45000">
             <a:normAutofit/>
           </a:bodyPr>
           <a:p>
@@ -4612,6 +4219,7 @@
                   <a:srgbClr val="404040"/>
                 </a:solidFill>
                 <a:latin typeface="Times New Roman"/>
+                <a:ea typeface="DejaVu Sans"/>
               </a:rPr>
               <a:t>UnSkool is a web platform for users to take various educational courses, quizzes, post articles and gain points. Thus, bringing in Gamification to Education.</a:t>
             </a:r>
@@ -4673,14 +4281,14 @@
       </p:grpSpPr>
       <p:sp>
         <p:nvSpPr>
-          <p:cNvPr id="100" name="CustomShape 1"/>
+          <p:cNvPr id="97" name="CustomShape 1"/>
           <p:cNvSpPr/>
           <p:nvPr/>
         </p:nvSpPr>
         <p:spPr>
           <a:xfrm>
             <a:off x="2520" y="5292360"/>
-            <a:ext cx="10077480" cy="377640"/>
+            <a:ext cx="10077120" cy="377280"/>
           </a:xfrm>
           <a:prstGeom prst="rect">
             <a:avLst/>
@@ -4709,14 +4317,14 @@
       </p:sp>
       <p:sp>
         <p:nvSpPr>
-          <p:cNvPr id="101" name="CustomShape 2"/>
+          <p:cNvPr id="98" name="CustomShape 2"/>
           <p:cNvSpPr/>
           <p:nvPr/>
         </p:nvSpPr>
         <p:spPr>
           <a:xfrm>
             <a:off x="0" y="5237640"/>
-            <a:ext cx="10077480" cy="52560"/>
+            <a:ext cx="10077120" cy="52200"/>
           </a:xfrm>
           <a:prstGeom prst="rect">
             <a:avLst/>
@@ -4745,7 +4353,7 @@
       </p:sp>
       <p:sp>
         <p:nvSpPr>
-          <p:cNvPr id="102" name="Line 3"/>
+          <p:cNvPr id="99" name="Line 3"/>
           <p:cNvSpPr/>
           <p:nvPr/>
         </p:nvSpPr>
@@ -4782,14 +4390,14 @@
       </p:sp>
       <p:sp>
         <p:nvSpPr>
-          <p:cNvPr id="103" name="CustomShape 4"/>
+          <p:cNvPr id="100" name="CustomShape 4"/>
           <p:cNvSpPr/>
           <p:nvPr/>
         </p:nvSpPr>
         <p:spPr>
           <a:xfrm>
             <a:off x="0" y="0"/>
-            <a:ext cx="10075680" cy="5670360"/>
+            <a:ext cx="10075320" cy="5670000"/>
           </a:xfrm>
           <a:prstGeom prst="rect">
             <a:avLst/>
@@ -4818,14 +4426,14 @@
       </p:sp>
       <p:sp>
         <p:nvSpPr>
-          <p:cNvPr id="104" name="CustomShape 5"/>
+          <p:cNvPr id="101" name="CustomShape 5"/>
           <p:cNvSpPr/>
           <p:nvPr/>
         </p:nvSpPr>
         <p:spPr>
           <a:xfrm>
             <a:off x="0" y="0"/>
-            <a:ext cx="3349080" cy="5670360"/>
+            <a:ext cx="3348720" cy="5670000"/>
           </a:xfrm>
           <a:prstGeom prst="rect">
             <a:avLst/>
@@ -4854,14 +4462,14 @@
       </p:sp>
       <p:sp>
         <p:nvSpPr>
-          <p:cNvPr id="105" name="CustomShape 6"/>
+          <p:cNvPr id="102" name="CustomShape 6"/>
           <p:cNvSpPr/>
           <p:nvPr/>
         </p:nvSpPr>
         <p:spPr>
           <a:xfrm>
             <a:off x="407160" y="501120"/>
-            <a:ext cx="2550240" cy="4668120"/>
+            <a:ext cx="2549880" cy="4667760"/>
           </a:xfrm>
           <a:prstGeom prst="rect">
             <a:avLst/>
@@ -4878,7 +4486,7 @@
           <a:fontRef idx="minor"/>
         </p:style>
         <p:txBody>
-          <a:bodyPr anchor="ctr">
+          <a:bodyPr lIns="90000" rIns="90000" tIns="45000" bIns="45000" anchor="ctr">
             <a:normAutofit/>
           </a:bodyPr>
           <a:p>
@@ -4896,6 +4504,7 @@
                   <a:srgbClr val="ffffff"/>
                 </a:solidFill>
                 <a:latin typeface="Calibri Light"/>
+                <a:ea typeface="DejaVu Sans"/>
               </a:rPr>
               <a:t>Proposed Solution  </a:t>
             </a:r>
@@ -4907,14 +4516,14 @@
       </p:sp>
       <p:sp>
         <p:nvSpPr>
-          <p:cNvPr id="106" name="CustomShape 7"/>
+          <p:cNvPr id="103" name="CustomShape 7"/>
           <p:cNvSpPr/>
           <p:nvPr/>
         </p:nvSpPr>
         <p:spPr>
           <a:xfrm>
             <a:off x="3340440" y="0"/>
-            <a:ext cx="52560" cy="5670360"/>
+            <a:ext cx="52200" cy="5670000"/>
           </a:xfrm>
           <a:prstGeom prst="rect">
             <a:avLst/>
@@ -4943,14 +4552,14 @@
       </p:sp>
       <p:sp>
         <p:nvSpPr>
-          <p:cNvPr id="107" name="CustomShape 8"/>
+          <p:cNvPr id="104" name="CustomShape 8"/>
           <p:cNvSpPr/>
           <p:nvPr/>
         </p:nvSpPr>
         <p:spPr>
           <a:xfrm>
             <a:off x="3920760" y="501120"/>
-            <a:ext cx="5481000" cy="5013000"/>
+            <a:ext cx="5480640" cy="5012640"/>
           </a:xfrm>
           <a:prstGeom prst="rect">
             <a:avLst/>
@@ -4967,11 +4576,11 @@
           <a:fontRef idx="minor"/>
         </p:style>
         <p:txBody>
-          <a:bodyPr lIns="0" rIns="0" anchor="ctr">
+          <a:bodyPr lIns="0" rIns="0" tIns="45000" bIns="45000" anchor="ctr">
             <a:noAutofit/>
           </a:bodyPr>
           <a:p>
-            <a:pPr marL="285840" indent="-285480">
+            <a:pPr marL="285840" indent="-285120">
               <a:lnSpc>
                 <a:spcPct val="90000"/>
               </a:lnSpc>
@@ -4991,6 +4600,7 @@
                   <a:srgbClr val="404040"/>
                 </a:solidFill>
                 <a:latin typeface="Times New Roman"/>
+                <a:ea typeface="DejaVu Sans"/>
               </a:rPr>
               <a:t>Our solution is to build a website which has video lectures, quizzes, text lessons for students to study.</a:t>
             </a:r>
@@ -5012,7 +4622,7 @@
             </a:endParaRPr>
           </a:p>
           <a:p>
-            <a:pPr marL="285840" indent="-285480">
+            <a:pPr marL="285840" indent="-285120">
               <a:lnSpc>
                 <a:spcPct val="90000"/>
               </a:lnSpc>
@@ -5032,6 +4642,7 @@
                   <a:srgbClr val="404040"/>
                 </a:solidFill>
                 <a:latin typeface="Times New Roman"/>
+                <a:ea typeface="DejaVu Sans"/>
               </a:rPr>
               <a:t>The students would receive points for completing each video/text lesson/quiz. </a:t>
             </a:r>
@@ -5053,7 +4664,7 @@
             </a:endParaRPr>
           </a:p>
           <a:p>
-            <a:pPr marL="285840" indent="-285480">
+            <a:pPr marL="285840" indent="-285120">
               <a:lnSpc>
                 <a:spcPct val="90000"/>
               </a:lnSpc>
@@ -5073,6 +4684,7 @@
                   <a:srgbClr val="404040"/>
                 </a:solidFill>
                 <a:latin typeface="Times New Roman"/>
+                <a:ea typeface="DejaVu Sans"/>
               </a:rPr>
               <a:t>The lessons would be based on the field that a student chooses.</a:t>
             </a:r>
@@ -5094,7 +4706,7 @@
             </a:endParaRPr>
           </a:p>
           <a:p>
-            <a:pPr marL="285840" indent="-285480">
+            <a:pPr marL="285840" indent="-285120">
               <a:lnSpc>
                 <a:spcPct val="90000"/>
               </a:lnSpc>
@@ -5114,6 +4726,7 @@
                   <a:srgbClr val="404040"/>
                 </a:solidFill>
                 <a:latin typeface="Times New Roman"/>
+                <a:ea typeface="DejaVu Sans"/>
               </a:rPr>
               <a:t>There would be levels based on the points that a user has. </a:t>
             </a:r>
@@ -5135,7 +4748,7 @@
             </a:endParaRPr>
           </a:p>
           <a:p>
-            <a:pPr marL="285840" indent="-285480">
+            <a:pPr marL="285840" indent="-285120">
               <a:lnSpc>
                 <a:spcPct val="90000"/>
               </a:lnSpc>
@@ -5155,6 +4768,7 @@
                   <a:srgbClr val="404040"/>
                 </a:solidFill>
                 <a:latin typeface="Times New Roman"/>
+                <a:ea typeface="DejaVu Sans"/>
               </a:rPr>
               <a:t>There would be prizes  after a certain level. (for eg. Gift Cards when a user reaches a certain level)    </a:t>
             </a:r>
@@ -5242,14 +4856,14 @@
       </p:grpSpPr>
       <p:sp>
         <p:nvSpPr>
-          <p:cNvPr id="108" name="CustomShape 1"/>
+          <p:cNvPr id="105" name="CustomShape 1"/>
           <p:cNvSpPr/>
           <p:nvPr/>
         </p:nvSpPr>
         <p:spPr>
           <a:xfrm>
             <a:off x="2520" y="5292360"/>
-            <a:ext cx="10077480" cy="377640"/>
+            <a:ext cx="10077120" cy="377280"/>
           </a:xfrm>
           <a:prstGeom prst="rect">
             <a:avLst/>
@@ -5278,14 +4892,14 @@
       </p:sp>
       <p:sp>
         <p:nvSpPr>
-          <p:cNvPr id="109" name="CustomShape 2"/>
+          <p:cNvPr id="106" name="CustomShape 2"/>
           <p:cNvSpPr/>
           <p:nvPr/>
         </p:nvSpPr>
         <p:spPr>
           <a:xfrm>
             <a:off x="0" y="5237640"/>
-            <a:ext cx="10077480" cy="52560"/>
+            <a:ext cx="10077120" cy="52200"/>
           </a:xfrm>
           <a:prstGeom prst="rect">
             <a:avLst/>
@@ -5314,7 +4928,7 @@
       </p:sp>
       <p:sp>
         <p:nvSpPr>
-          <p:cNvPr id="110" name="Line 3"/>
+          <p:cNvPr id="107" name="Line 3"/>
           <p:cNvSpPr/>
           <p:nvPr/>
         </p:nvSpPr>
@@ -5351,14 +4965,14 @@
       </p:sp>
       <p:sp>
         <p:nvSpPr>
-          <p:cNvPr id="111" name="CustomShape 4"/>
+          <p:cNvPr id="108" name="CustomShape 4"/>
           <p:cNvSpPr/>
           <p:nvPr/>
         </p:nvSpPr>
         <p:spPr>
           <a:xfrm>
             <a:off x="0" y="0"/>
-            <a:ext cx="10075680" cy="5670360"/>
+            <a:ext cx="10075320" cy="5670000"/>
           </a:xfrm>
           <a:prstGeom prst="rect">
             <a:avLst/>
@@ -5387,14 +5001,14 @@
       </p:sp>
       <p:sp>
         <p:nvSpPr>
-          <p:cNvPr id="112" name="CustomShape 5"/>
+          <p:cNvPr id="109" name="CustomShape 5"/>
           <p:cNvSpPr/>
           <p:nvPr/>
         </p:nvSpPr>
         <p:spPr>
           <a:xfrm>
             <a:off x="0" y="0"/>
-            <a:ext cx="3349080" cy="5670360"/>
+            <a:ext cx="3348720" cy="5670000"/>
           </a:xfrm>
           <a:prstGeom prst="rect">
             <a:avLst/>
@@ -5423,14 +5037,14 @@
       </p:sp>
       <p:sp>
         <p:nvSpPr>
-          <p:cNvPr id="113" name="TextShape 6"/>
-          <p:cNvSpPr txBox="1"/>
+          <p:cNvPr id="110" name="CustomShape 6"/>
+          <p:cNvSpPr/>
           <p:nvPr/>
         </p:nvSpPr>
         <p:spPr>
           <a:xfrm>
             <a:off x="407160" y="501120"/>
-            <a:ext cx="2550240" cy="4668120"/>
+            <a:ext cx="2549880" cy="4667760"/>
           </a:xfrm>
           <a:prstGeom prst="rect">
             <a:avLst/>
@@ -5440,8 +5054,14 @@
             <a:noFill/>
           </a:ln>
         </p:spPr>
-        <p:txBody>
-          <a:bodyPr anchor="ctr">
+        <p:style>
+          <a:lnRef idx="0"/>
+          <a:fillRef idx="0"/>
+          <a:effectRef idx="0"/>
+          <a:fontRef idx="minor"/>
+        </p:style>
+        <p:txBody>
+          <a:bodyPr lIns="90000" rIns="90000" tIns="45000" bIns="45000" anchor="ctr">
             <a:normAutofit/>
           </a:bodyPr>
           <a:p>
@@ -5459,25 +5079,22 @@
               </a:rPr>
               <a:t>Proposed Solution</a:t>
             </a:r>
-            <a:endParaRPr b="0" lang="en-US" sz="3000" spc="-1" strike="noStrike">
-              <a:solidFill>
-                <a:srgbClr val="000000"/>
-              </a:solidFill>
-              <a:latin typeface="Calibri"/>
-            </a:endParaRPr>
-          </a:p>
-        </p:txBody>
-      </p:sp>
-      <p:sp>
-        <p:nvSpPr>
-          <p:cNvPr id="114" name="CustomShape 7"/>
+            <a:endParaRPr b="0" lang="en-IN" sz="3000" spc="-1" strike="noStrike">
+              <a:latin typeface="Arial"/>
+            </a:endParaRPr>
+          </a:p>
+        </p:txBody>
+      </p:sp>
+      <p:sp>
+        <p:nvSpPr>
+          <p:cNvPr id="111" name="CustomShape 7"/>
           <p:cNvSpPr/>
           <p:nvPr/>
         </p:nvSpPr>
         <p:spPr>
           <a:xfrm>
             <a:off x="3340440" y="0"/>
-            <a:ext cx="52560" cy="5670360"/>
+            <a:ext cx="52200" cy="5670000"/>
           </a:xfrm>
           <a:prstGeom prst="rect">
             <a:avLst/>
@@ -5506,14 +5123,14 @@
       </p:sp>
       <p:sp>
         <p:nvSpPr>
-          <p:cNvPr id="115" name="TextShape 8"/>
-          <p:cNvSpPr txBox="1"/>
+          <p:cNvPr id="112" name="CustomShape 8"/>
+          <p:cNvSpPr/>
           <p:nvPr/>
         </p:nvSpPr>
         <p:spPr>
           <a:xfrm>
             <a:off x="3920760" y="501120"/>
-            <a:ext cx="5302440" cy="4668120"/>
+            <a:ext cx="5302080" cy="4667760"/>
           </a:xfrm>
           <a:prstGeom prst="rect">
             <a:avLst/>
@@ -5523,8 +5140,14 @@
             <a:noFill/>
           </a:ln>
         </p:spPr>
-        <p:txBody>
-          <a:bodyPr lIns="0" rIns="0" anchor="ctr">
+        <p:style>
+          <a:lnRef idx="0"/>
+          <a:fillRef idx="0"/>
+          <a:effectRef idx="0"/>
+          <a:fontRef idx="minor"/>
+        </p:style>
+        <p:txBody>
+          <a:bodyPr lIns="0" rIns="0" tIns="45000" bIns="45000" anchor="ctr">
             <a:noAutofit/>
           </a:bodyPr>
           <a:p>
@@ -5539,12 +5162,12 @@
                 <a:tab algn="l" pos="0"/>
               </a:tabLst>
             </a:pPr>
-            <a:endParaRPr b="0" lang="en-IN" sz="3200" spc="-1" strike="noStrike">
-              <a:latin typeface="Arial"/>
-            </a:endParaRPr>
-          </a:p>
-          <a:p>
-            <a:pPr marL="285840" indent="-285480">
+            <a:endParaRPr b="0" lang="en-IN" sz="1800" spc="-1" strike="noStrike">
+              <a:latin typeface="Arial"/>
+            </a:endParaRPr>
+          </a:p>
+          <a:p>
+            <a:pPr marL="285840" indent="-285120">
               <a:lnSpc>
                 <a:spcPct val="90000"/>
               </a:lnSpc>
@@ -5567,61 +5190,7 @@
                 </a:solidFill>
                 <a:latin typeface="Times New Roman"/>
               </a:rPr>
-              <a:t>Further there would be </a:t>
-            </a:r>
-            <a:r>
-              <a:rPr b="0" lang="en-US" sz="1800" spc="-1" strike="noStrike">
-                <a:solidFill>
-                  <a:srgbClr val="404040"/>
-                </a:solidFill>
-                <a:latin typeface="Times New Roman"/>
-              </a:rPr>
-              <a:t>a tech updates section </a:t>
-            </a:r>
-            <a:r>
-              <a:rPr b="0" lang="en-US" sz="1800" spc="-1" strike="noStrike">
-                <a:solidFill>
-                  <a:srgbClr val="404040"/>
-                </a:solidFill>
-                <a:latin typeface="Times New Roman"/>
-              </a:rPr>
-              <a:t>where users could read </a:t>
-            </a:r>
-            <a:r>
-              <a:rPr b="0" lang="en-US" sz="1800" spc="-1" strike="noStrike">
-                <a:solidFill>
-                  <a:srgbClr val="404040"/>
-                </a:solidFill>
-                <a:latin typeface="Times New Roman"/>
-              </a:rPr>
-              <a:t>articles about latest </a:t>
-            </a:r>
-            <a:r>
-              <a:rPr b="0" lang="en-US" sz="1800" spc="-1" strike="noStrike">
-                <a:solidFill>
-                  <a:srgbClr val="404040"/>
-                </a:solidFill>
-                <a:latin typeface="Times New Roman"/>
-              </a:rPr>
-              <a:t>tech. The articles would </a:t>
-            </a:r>
-            <a:r>
-              <a:rPr b="0" lang="en-US" sz="1800" spc="-1" strike="noStrike">
-                <a:solidFill>
-                  <a:srgbClr val="404040"/>
-                </a:solidFill>
-                <a:latin typeface="Times New Roman"/>
-              </a:rPr>
-              <a:t>be available in audio </a:t>
-            </a:r>
-            <a:r>
-              <a:rPr b="0" lang="en-US" sz="1800" spc="-1" strike="noStrike">
-                <a:solidFill>
-                  <a:srgbClr val="404040"/>
-                </a:solidFill>
-                <a:latin typeface="Times New Roman"/>
-              </a:rPr>
-              <a:t>format too. </a:t>
+              <a:t>Further there would be a tech updates section where users could read articles about latest tech. The articles would be available in audio format too. </a:t>
             </a:r>
             <a:endParaRPr b="0" lang="en-IN" sz="1800" spc="-1" strike="noStrike">
               <a:latin typeface="Arial"/>
@@ -5644,7 +5213,7 @@
             </a:endParaRPr>
           </a:p>
           <a:p>
-            <a:pPr marL="285840" indent="-285480">
+            <a:pPr marL="285840" indent="-285120">
               <a:lnSpc>
                 <a:spcPct val="90000"/>
               </a:lnSpc>
@@ -5667,34 +5236,7 @@
                 </a:solidFill>
                 <a:latin typeface="Times New Roman"/>
               </a:rPr>
-              <a:t>Users would be able to </a:t>
-            </a:r>
-            <a:r>
-              <a:rPr b="0" lang="en-US" sz="1800" spc="-1" strike="noStrike">
-                <a:solidFill>
-                  <a:srgbClr val="404040"/>
-                </a:solidFill>
-                <a:latin typeface="Times New Roman"/>
-              </a:rPr>
-              <a:t>write their own articles. </a:t>
-            </a:r>
-            <a:r>
-              <a:rPr b="0" lang="en-US" sz="1800" spc="-1" strike="noStrike">
-                <a:solidFill>
-                  <a:srgbClr val="404040"/>
-                </a:solidFill>
-                <a:latin typeface="Times New Roman"/>
-              </a:rPr>
-              <a:t>This would contribute </a:t>
-            </a:r>
-            <a:r>
-              <a:rPr b="0" lang="en-US" sz="1800" spc="-1" strike="noStrike">
-                <a:solidFill>
-                  <a:srgbClr val="404040"/>
-                </a:solidFill>
-                <a:latin typeface="Times New Roman"/>
-              </a:rPr>
-              <a:t>to their  points.</a:t>
+              <a:t>Users would be able to write their own articles. This would contribute to their  points.</a:t>
             </a:r>
             <a:endParaRPr b="0" lang="en-IN" sz="1800" spc="-1" strike="noStrike">
               <a:latin typeface="Arial"/>
@@ -5717,7 +5259,7 @@
             </a:endParaRPr>
           </a:p>
           <a:p>
-            <a:pPr marL="285840" indent="-285480">
+            <a:pPr marL="285840" indent="-285120">
               <a:lnSpc>
                 <a:spcPct val="90000"/>
               </a:lnSpc>
@@ -5740,52 +5282,7 @@
                 </a:solidFill>
                 <a:latin typeface="Times New Roman"/>
               </a:rPr>
-              <a:t>here would be a </a:t>
-            </a:r>
-            <a:r>
-              <a:rPr b="0" lang="en-US" sz="1800" spc="-1" strike="noStrike">
-                <a:solidFill>
-                  <a:srgbClr val="404040"/>
-                </a:solidFill>
-                <a:latin typeface="Times New Roman"/>
-              </a:rPr>
-              <a:t>Discuss section where </a:t>
-            </a:r>
-            <a:r>
-              <a:rPr b="0" lang="en-US" sz="1800" spc="-1" strike="noStrike">
-                <a:solidFill>
-                  <a:srgbClr val="404040"/>
-                </a:solidFill>
-                <a:latin typeface="Times New Roman"/>
-              </a:rPr>
-              <a:t>students can discuss </a:t>
-            </a:r>
-            <a:r>
-              <a:rPr b="0" lang="en-US" sz="1800" spc="-1" strike="noStrike">
-                <a:solidFill>
-                  <a:srgbClr val="404040"/>
-                </a:solidFill>
-                <a:latin typeface="Times New Roman"/>
-              </a:rPr>
-              <a:t>their doubts , these </a:t>
-            </a:r>
-            <a:r>
-              <a:rPr b="0" lang="en-US" sz="1800" spc="-1" strike="noStrike">
-                <a:solidFill>
-                  <a:srgbClr val="404040"/>
-                </a:solidFill>
-                <a:latin typeface="Times New Roman"/>
-              </a:rPr>
-              <a:t>doubts can be answered </a:t>
-            </a:r>
-            <a:r>
-              <a:rPr b="0" lang="en-US" sz="1800" spc="-1" strike="noStrike">
-                <a:solidFill>
-                  <a:srgbClr val="404040"/>
-                </a:solidFill>
-                <a:latin typeface="Times New Roman"/>
-              </a:rPr>
-              <a:t>by peers or by teachers.</a:t>
+              <a:t>There would be a Discuss section where students can discuss their doubts , these doubts can be answered by peers or by teachers.</a:t>
             </a:r>
             <a:endParaRPr b="0" lang="en-IN" sz="1800" spc="-1" strike="noStrike">
               <a:latin typeface="Arial"/>
@@ -5808,7 +5305,7 @@
             </a:endParaRPr>
           </a:p>
           <a:p>
-            <a:pPr marL="285840" indent="-285480">
+            <a:pPr marL="285840" indent="-285120">
               <a:lnSpc>
                 <a:spcPct val="90000"/>
               </a:lnSpc>
@@ -5831,34 +5328,7 @@
                 </a:solidFill>
                 <a:latin typeface="Times New Roman"/>
               </a:rPr>
-              <a:t>The users would be </a:t>
-            </a:r>
-            <a:r>
-              <a:rPr b="0" lang="en-US" sz="1800" spc="-1" strike="noStrike">
-                <a:solidFill>
-                  <a:srgbClr val="404040"/>
-                </a:solidFill>
-                <a:latin typeface="Times New Roman"/>
-              </a:rPr>
-              <a:t>ranked based on points </a:t>
-            </a:r>
-            <a:r>
-              <a:rPr b="0" lang="en-US" sz="1800" spc="-1" strike="noStrike">
-                <a:solidFill>
-                  <a:srgbClr val="404040"/>
-                </a:solidFill>
-                <a:latin typeface="Times New Roman"/>
-              </a:rPr>
-              <a:t>and levels </a:t>
-            </a:r>
-            <a:r>
-              <a:rPr b="0" lang="en-US" sz="1800" spc="-1" strike="noStrike">
-                <a:solidFill>
-                  <a:srgbClr val="404040"/>
-                </a:solidFill>
-                <a:latin typeface="Times New Roman"/>
-              </a:rPr>
-              <a:t>(Leaderboard) </a:t>
+              <a:t>The users would be ranked based on points and levels (Leaderboard) </a:t>
             </a:r>
             <a:endParaRPr b="0" lang="en-IN" sz="1800" spc="-1" strike="noStrike">
               <a:latin typeface="Arial"/>
@@ -5940,14 +5410,14 @@
       </p:grpSpPr>
       <p:sp>
         <p:nvSpPr>
-          <p:cNvPr id="116" name="CustomShape 1"/>
+          <p:cNvPr id="113" name="CustomShape 1"/>
           <p:cNvSpPr/>
           <p:nvPr/>
         </p:nvSpPr>
         <p:spPr>
           <a:xfrm>
             <a:off x="2520" y="5292360"/>
-            <a:ext cx="10077480" cy="377640"/>
+            <a:ext cx="10077120" cy="377280"/>
           </a:xfrm>
           <a:prstGeom prst="rect">
             <a:avLst/>
@@ -5976,14 +5446,14 @@
       </p:sp>
       <p:sp>
         <p:nvSpPr>
-          <p:cNvPr id="117" name="CustomShape 2"/>
+          <p:cNvPr id="114" name="CustomShape 2"/>
           <p:cNvSpPr/>
           <p:nvPr/>
         </p:nvSpPr>
         <p:spPr>
           <a:xfrm>
             <a:off x="0" y="5237640"/>
-            <a:ext cx="10077480" cy="52560"/>
+            <a:ext cx="10077120" cy="52200"/>
           </a:xfrm>
           <a:prstGeom prst="rect">
             <a:avLst/>
@@ -6012,7 +5482,7 @@
       </p:sp>
       <p:sp>
         <p:nvSpPr>
-          <p:cNvPr id="118" name="Line 3"/>
+          <p:cNvPr id="115" name="Line 3"/>
           <p:cNvSpPr/>
           <p:nvPr/>
         </p:nvSpPr>
@@ -6049,14 +5519,14 @@
       </p:sp>
       <p:sp>
         <p:nvSpPr>
-          <p:cNvPr id="119" name="CustomShape 4"/>
+          <p:cNvPr id="116" name="CustomShape 4"/>
           <p:cNvSpPr/>
           <p:nvPr/>
         </p:nvSpPr>
         <p:spPr>
           <a:xfrm>
             <a:off x="0" y="0"/>
-            <a:ext cx="10075680" cy="5670360"/>
+            <a:ext cx="10075320" cy="5670000"/>
           </a:xfrm>
           <a:prstGeom prst="rect">
             <a:avLst/>
@@ -6085,14 +5555,14 @@
       </p:sp>
       <p:sp>
         <p:nvSpPr>
-          <p:cNvPr id="120" name="CustomShape 5"/>
+          <p:cNvPr id="117" name="CustomShape 5"/>
           <p:cNvSpPr/>
           <p:nvPr/>
         </p:nvSpPr>
         <p:spPr>
           <a:xfrm>
             <a:off x="0" y="0"/>
-            <a:ext cx="3349080" cy="5670360"/>
+            <a:ext cx="3348720" cy="5670000"/>
           </a:xfrm>
           <a:prstGeom prst="rect">
             <a:avLst/>
@@ -6121,14 +5591,14 @@
       </p:sp>
       <p:sp>
         <p:nvSpPr>
-          <p:cNvPr id="121" name="CustomShape 6"/>
+          <p:cNvPr id="118" name="CustomShape 6"/>
           <p:cNvSpPr/>
           <p:nvPr/>
         </p:nvSpPr>
         <p:spPr>
           <a:xfrm>
             <a:off x="407160" y="501120"/>
-            <a:ext cx="2550240" cy="4668120"/>
+            <a:ext cx="2549880" cy="4667760"/>
           </a:xfrm>
           <a:prstGeom prst="rect">
             <a:avLst/>
@@ -6145,7 +5615,7 @@
           <a:fontRef idx="minor"/>
         </p:style>
         <p:txBody>
-          <a:bodyPr anchor="ctr">
+          <a:bodyPr lIns="90000" rIns="90000" tIns="45000" bIns="45000" anchor="ctr">
             <a:normAutofit/>
           </a:bodyPr>
           <a:p>
@@ -6163,6 +5633,7 @@
                   <a:srgbClr val="ffffff"/>
                 </a:solidFill>
                 <a:latin typeface="Calibri Light"/>
+                <a:ea typeface="DejaVu Sans"/>
               </a:rPr>
               <a:t>Required Technology</a:t>
             </a:r>
@@ -6174,14 +5645,14 @@
       </p:sp>
       <p:sp>
         <p:nvSpPr>
-          <p:cNvPr id="122" name="CustomShape 7"/>
+          <p:cNvPr id="119" name="CustomShape 7"/>
           <p:cNvSpPr/>
           <p:nvPr/>
         </p:nvSpPr>
         <p:spPr>
           <a:xfrm>
             <a:off x="3340440" y="0"/>
-            <a:ext cx="52560" cy="5670360"/>
+            <a:ext cx="52200" cy="5670000"/>
           </a:xfrm>
           <a:prstGeom prst="rect">
             <a:avLst/>
@@ -6210,14 +5681,14 @@
       </p:sp>
       <p:sp>
         <p:nvSpPr>
-          <p:cNvPr id="123" name="CustomShape 8"/>
+          <p:cNvPr id="120" name="CustomShape 8"/>
           <p:cNvSpPr/>
           <p:nvPr/>
         </p:nvSpPr>
         <p:spPr>
           <a:xfrm>
             <a:off x="3920760" y="501120"/>
-            <a:ext cx="5302440" cy="4668120"/>
+            <a:ext cx="5302080" cy="4667760"/>
           </a:xfrm>
           <a:prstGeom prst="rect">
             <a:avLst/>
@@ -6234,11 +5705,11 @@
           <a:fontRef idx="minor"/>
         </p:style>
         <p:txBody>
-          <a:bodyPr lIns="0" rIns="0" anchor="ctr">
+          <a:bodyPr lIns="0" rIns="0" tIns="45000" bIns="45000" anchor="ctr">
             <a:normAutofit/>
           </a:bodyPr>
           <a:p>
-            <a:pPr marL="343080" indent="-342720">
+            <a:pPr marL="343080" indent="-342360">
               <a:lnSpc>
                 <a:spcPct val="90000"/>
               </a:lnSpc>
@@ -6258,6 +5729,7 @@
                   <a:srgbClr val="404040"/>
                 </a:solidFill>
                 <a:latin typeface="Times New Roman"/>
+                <a:ea typeface="DejaVu Sans"/>
               </a:rPr>
               <a:t>The website would be developed using HTML, CSS, JavaScript, BootStrap as the base.</a:t>
             </a:r>
@@ -6279,7 +5751,7 @@
             </a:endParaRPr>
           </a:p>
           <a:p>
-            <a:pPr marL="343080" indent="-342720">
+            <a:pPr marL="343080" indent="-342360">
               <a:lnSpc>
                 <a:spcPct val="90000"/>
               </a:lnSpc>
@@ -6299,6 +5771,7 @@
                   <a:srgbClr val="404040"/>
                 </a:solidFill>
                 <a:latin typeface="Times New Roman"/>
+                <a:ea typeface="DejaVu Sans"/>
               </a:rPr>
               <a:t>For Backend we would use PHP with MySQL.  We could also use Firebase based on the requirements.</a:t>
             </a:r>
@@ -6320,7 +5793,7 @@
             </a:endParaRPr>
           </a:p>
           <a:p>
-            <a:pPr marL="343080" indent="-342720">
+            <a:pPr marL="343080" indent="-342360">
               <a:lnSpc>
                 <a:spcPct val="90000"/>
               </a:lnSpc>
@@ -6340,6 +5813,7 @@
                   <a:srgbClr val="404040"/>
                 </a:solidFill>
                 <a:latin typeface="Times New Roman"/>
+                <a:ea typeface="DejaVu Sans"/>
               </a:rPr>
               <a:t>The website source code would be available on Github and we would try to host the website on Github Pages.</a:t>
             </a:r>
@@ -6414,14 +5888,14 @@
       </p:grpSpPr>
       <p:sp>
         <p:nvSpPr>
-          <p:cNvPr id="124" name="CustomShape 1"/>
+          <p:cNvPr id="121" name="CustomShape 1"/>
           <p:cNvSpPr/>
           <p:nvPr/>
         </p:nvSpPr>
         <p:spPr>
           <a:xfrm>
             <a:off x="2520" y="5292360"/>
-            <a:ext cx="10077480" cy="377640"/>
+            <a:ext cx="10077120" cy="377280"/>
           </a:xfrm>
           <a:prstGeom prst="rect">
             <a:avLst/>
@@ -6450,14 +5924,14 @@
       </p:sp>
       <p:sp>
         <p:nvSpPr>
-          <p:cNvPr id="125" name="CustomShape 2"/>
+          <p:cNvPr id="122" name="CustomShape 2"/>
           <p:cNvSpPr/>
           <p:nvPr/>
         </p:nvSpPr>
         <p:spPr>
           <a:xfrm>
             <a:off x="0" y="5237640"/>
-            <a:ext cx="10077480" cy="52560"/>
+            <a:ext cx="10077120" cy="52200"/>
           </a:xfrm>
           <a:prstGeom prst="rect">
             <a:avLst/>
@@ -6486,7 +5960,7 @@
       </p:sp>
       <p:sp>
         <p:nvSpPr>
-          <p:cNvPr id="126" name="Line 3"/>
+          <p:cNvPr id="123" name="Line 3"/>
           <p:cNvSpPr/>
           <p:nvPr/>
         </p:nvSpPr>
@@ -6523,14 +5997,14 @@
       </p:sp>
       <p:sp>
         <p:nvSpPr>
-          <p:cNvPr id="127" name="CustomShape 4"/>
+          <p:cNvPr id="124" name="CustomShape 4"/>
           <p:cNvSpPr/>
           <p:nvPr/>
         </p:nvSpPr>
         <p:spPr>
           <a:xfrm>
             <a:off x="0" y="0"/>
-            <a:ext cx="10077840" cy="5670360"/>
+            <a:ext cx="10077480" cy="5670000"/>
           </a:xfrm>
           <a:prstGeom prst="rect">
             <a:avLst/>
@@ -6559,14 +6033,14 @@
       </p:sp>
       <p:sp>
         <p:nvSpPr>
-          <p:cNvPr id="128" name="CustomShape 5"/>
+          <p:cNvPr id="125" name="CustomShape 5"/>
           <p:cNvSpPr/>
           <p:nvPr/>
         </p:nvSpPr>
         <p:spPr>
           <a:xfrm>
             <a:off x="266040" y="264600"/>
-            <a:ext cx="9548640" cy="5140800"/>
+            <a:ext cx="9548280" cy="5140440"/>
           </a:xfrm>
           <a:prstGeom prst="rect">
             <a:avLst/>
@@ -6595,14 +6069,14 @@
       </p:sp>
       <p:sp>
         <p:nvSpPr>
-          <p:cNvPr id="129" name="TextShape 6"/>
-          <p:cNvSpPr txBox="1"/>
+          <p:cNvPr id="126" name="CustomShape 6"/>
+          <p:cNvSpPr/>
           <p:nvPr/>
         </p:nvSpPr>
         <p:spPr>
           <a:xfrm>
             <a:off x="797760" y="797040"/>
-            <a:ext cx="2690640" cy="4082760"/>
+            <a:ext cx="2690280" cy="4082400"/>
           </a:xfrm>
           <a:prstGeom prst="rect">
             <a:avLst/>
@@ -6612,8 +6086,14 @@
             <a:noFill/>
           </a:ln>
         </p:spPr>
-        <p:txBody>
-          <a:bodyPr anchor="ctr">
+        <p:style>
+          <a:lnRef idx="0"/>
+          <a:fillRef idx="0"/>
+          <a:effectRef idx="0"/>
+          <a:fontRef idx="minor"/>
+        </p:style>
+        <p:txBody>
+          <a:bodyPr lIns="90000" rIns="90000" tIns="45000" bIns="45000" anchor="ctr">
             <a:normAutofit/>
           </a:bodyPr>
           <a:p>
@@ -6631,18 +6111,15 @@
               </a:rPr>
               <a:t>Components</a:t>
             </a:r>
-            <a:endParaRPr b="0" lang="en-US" sz="3000" spc="-1" strike="noStrike">
-              <a:solidFill>
-                <a:srgbClr val="000000"/>
-              </a:solidFill>
-              <a:latin typeface="Calibri"/>
-            </a:endParaRPr>
-          </a:p>
-        </p:txBody>
-      </p:sp>
-      <p:sp>
-        <p:nvSpPr>
-          <p:cNvPr id="130" name="Line 7"/>
+            <a:endParaRPr b="0" lang="en-IN" sz="3000" spc="-1" strike="noStrike">
+              <a:latin typeface="Arial"/>
+            </a:endParaRPr>
+          </a:p>
+        </p:txBody>
+      </p:sp>
+      <p:sp>
+        <p:nvSpPr>
+          <p:cNvPr id="127" name="Line 7"/>
           <p:cNvSpPr/>
           <p:nvPr/>
         </p:nvSpPr>
@@ -6676,14 +6153,14 @@
       </p:sp>
       <p:sp>
         <p:nvSpPr>
-          <p:cNvPr id="131" name="TextShape 8"/>
-          <p:cNvSpPr txBox="1"/>
+          <p:cNvPr id="128" name="CustomShape 8"/>
+          <p:cNvSpPr/>
           <p:nvPr/>
         </p:nvSpPr>
         <p:spPr>
           <a:xfrm>
             <a:off x="4245480" y="796680"/>
-            <a:ext cx="5072400" cy="4083480"/>
+            <a:ext cx="5072040" cy="4083120"/>
           </a:xfrm>
           <a:prstGeom prst="rect">
             <a:avLst/>
@@ -6693,8 +6170,14 @@
             <a:noFill/>
           </a:ln>
         </p:spPr>
-        <p:txBody>
-          <a:bodyPr lIns="0" rIns="0" anchor="ctr">
+        <p:style>
+          <a:lnRef idx="0"/>
+          <a:fillRef idx="0"/>
+          <a:effectRef idx="0"/>
+          <a:fontRef idx="minor"/>
+        </p:style>
+        <p:txBody>
+          <a:bodyPr lIns="0" rIns="0" tIns="45000" bIns="45000" anchor="ctr">
             <a:normAutofit/>
           </a:bodyPr>
           <a:p>
@@ -6709,12 +6192,12 @@
                 <a:spcPts val="601"/>
               </a:spcAft>
             </a:pPr>
-            <a:endParaRPr b="0" lang="en-IN" sz="3200" spc="-1" strike="noStrike">
-              <a:latin typeface="Arial"/>
-            </a:endParaRPr>
-          </a:p>
-          <a:p>
-            <a:pPr marL="285840" indent="-285480">
+            <a:endParaRPr b="0" lang="en-IN" sz="1800" spc="-1" strike="noStrike">
+              <a:latin typeface="Arial"/>
+            </a:endParaRPr>
+          </a:p>
+          <a:p>
+            <a:pPr marL="285840" indent="-285120">
               <a:lnSpc>
                 <a:spcPct val="90000"/>
               </a:lnSpc>
@@ -6744,7 +6227,7 @@
             </a:endParaRPr>
           </a:p>
           <a:p>
-            <a:pPr marL="285840" indent="-285480">
+            <a:pPr marL="285840" indent="-285120">
               <a:lnSpc>
                 <a:spcPct val="90000"/>
               </a:lnSpc>
@@ -6774,7 +6257,7 @@
             </a:endParaRPr>
           </a:p>
           <a:p>
-            <a:pPr marL="285840" indent="-285480">
+            <a:pPr marL="285840" indent="-285120">
               <a:lnSpc>
                 <a:spcPct val="90000"/>
               </a:lnSpc>
@@ -6804,7 +6287,7 @@
             </a:endParaRPr>
           </a:p>
           <a:p>
-            <a:pPr marL="285840" indent="-285480">
+            <a:pPr marL="285840" indent="-285120">
               <a:lnSpc>
                 <a:spcPct val="90000"/>
               </a:lnSpc>
@@ -6834,7 +6317,7 @@
             </a:endParaRPr>
           </a:p>
           <a:p>
-            <a:pPr marL="285840" indent="-285480">
+            <a:pPr marL="285840" indent="-285120">
               <a:lnSpc>
                 <a:spcPct val="90000"/>
               </a:lnSpc>
@@ -6864,7 +6347,7 @@
             </a:endParaRPr>
           </a:p>
           <a:p>
-            <a:pPr marL="285840" indent="-285480">
+            <a:pPr marL="285840" indent="-285120">
               <a:lnSpc>
                 <a:spcPct val="90000"/>
               </a:lnSpc>
@@ -6894,7 +6377,7 @@
             </a:endParaRPr>
           </a:p>
           <a:p>
-            <a:pPr marL="285840" indent="-285480">
+            <a:pPr marL="285840" indent="-285120">
               <a:lnSpc>
                 <a:spcPct val="90000"/>
               </a:lnSpc>
@@ -6964,14 +6447,14 @@
       </p:grpSpPr>
       <p:sp>
         <p:nvSpPr>
-          <p:cNvPr id="132" name="CustomShape 1"/>
+          <p:cNvPr id="129" name="CustomShape 1"/>
           <p:cNvSpPr/>
           <p:nvPr/>
         </p:nvSpPr>
         <p:spPr>
           <a:xfrm>
             <a:off x="0" y="5292360"/>
-            <a:ext cx="10080360" cy="377640"/>
+            <a:ext cx="10080000" cy="377280"/>
           </a:xfrm>
           <a:prstGeom prst="rect">
             <a:avLst/>
@@ -7000,14 +6483,14 @@
       </p:sp>
       <p:sp>
         <p:nvSpPr>
-          <p:cNvPr id="133" name="CustomShape 2"/>
+          <p:cNvPr id="130" name="CustomShape 2"/>
           <p:cNvSpPr/>
           <p:nvPr/>
         </p:nvSpPr>
         <p:spPr>
           <a:xfrm>
             <a:off x="0" y="5237640"/>
-            <a:ext cx="10080360" cy="54720"/>
+            <a:ext cx="10080000" cy="54360"/>
           </a:xfrm>
           <a:prstGeom prst="rect">
             <a:avLst/>
@@ -7036,7 +6519,7 @@
       </p:sp>
       <p:sp>
         <p:nvSpPr>
-          <p:cNvPr id="134" name="Line 3"/>
+          <p:cNvPr id="131" name="Line 3"/>
           <p:cNvSpPr/>
           <p:nvPr/>
         </p:nvSpPr>
@@ -7073,14 +6556,14 @@
       </p:sp>
       <p:sp>
         <p:nvSpPr>
-          <p:cNvPr id="135" name="CustomShape 4"/>
+          <p:cNvPr id="132" name="CustomShape 4"/>
           <p:cNvSpPr/>
           <p:nvPr/>
         </p:nvSpPr>
         <p:spPr>
           <a:xfrm>
             <a:off x="0" y="0"/>
-            <a:ext cx="10077840" cy="5670360"/>
+            <a:ext cx="10077480" cy="5670000"/>
           </a:xfrm>
           <a:prstGeom prst="rect">
             <a:avLst/>
@@ -7109,14 +6592,14 @@
       </p:sp>
       <p:sp>
         <p:nvSpPr>
-          <p:cNvPr id="136" name="TextShape 5"/>
-          <p:cNvSpPr txBox="1"/>
+          <p:cNvPr id="133" name="CustomShape 5"/>
+          <p:cNvSpPr/>
           <p:nvPr/>
         </p:nvSpPr>
         <p:spPr>
           <a:xfrm>
             <a:off x="798120" y="532080"/>
-            <a:ext cx="5171400" cy="4178520"/>
+            <a:ext cx="5171040" cy="4178160"/>
           </a:xfrm>
           <a:prstGeom prst="rect">
             <a:avLst/>
@@ -7126,8 +6609,14 @@
             <a:noFill/>
           </a:ln>
         </p:spPr>
-        <p:txBody>
-          <a:bodyPr anchor="ctr">
+        <p:style>
+          <a:lnRef idx="0"/>
+          <a:fillRef idx="0"/>
+          <a:effectRef idx="0"/>
+          <a:fontRef idx="minor"/>
+        </p:style>
+        <p:txBody>
+          <a:bodyPr lIns="90000" rIns="90000" tIns="45000" bIns="45000" anchor="ctr">
             <a:normAutofit/>
           </a:bodyPr>
           <a:p>
@@ -7148,18 +6637,15 @@
               </a:rPr>
               <a:t>Thank You</a:t>
             </a:r>
-            <a:endParaRPr b="0" lang="en-US" sz="7000" spc="-1" strike="noStrike">
-              <a:solidFill>
-                <a:srgbClr val="000000"/>
-              </a:solidFill>
-              <a:latin typeface="Calibri"/>
-            </a:endParaRPr>
-          </a:p>
-        </p:txBody>
-      </p:sp>
-      <p:sp>
-        <p:nvSpPr>
-          <p:cNvPr id="137" name="Line 6"/>
+            <a:endParaRPr b="0" lang="en-IN" sz="7000" spc="-1" strike="noStrike">
+              <a:latin typeface="Arial"/>
+            </a:endParaRPr>
+          </a:p>
+        </p:txBody>
+      </p:sp>
+      <p:sp>
+        <p:nvSpPr>
+          <p:cNvPr id="134" name="Line 6"/>
           <p:cNvSpPr/>
           <p:nvPr/>
         </p:nvSpPr>
@@ -7193,14 +6679,14 @@
       </p:sp>
       <p:sp>
         <p:nvSpPr>
-          <p:cNvPr id="138" name="CustomShape 7"/>
+          <p:cNvPr id="135" name="CustomShape 7"/>
           <p:cNvSpPr/>
           <p:nvPr/>
         </p:nvSpPr>
         <p:spPr>
           <a:xfrm>
             <a:off x="2520" y="5292360"/>
-            <a:ext cx="10077480" cy="377640"/>
+            <a:ext cx="10077120" cy="377280"/>
           </a:xfrm>
           <a:prstGeom prst="rect">
             <a:avLst/>
@@ -7229,14 +6715,14 @@
       </p:sp>
       <p:sp>
         <p:nvSpPr>
-          <p:cNvPr id="139" name="CustomShape 8"/>
+          <p:cNvPr id="136" name="CustomShape 8"/>
           <p:cNvSpPr/>
           <p:nvPr/>
         </p:nvSpPr>
         <p:spPr>
           <a:xfrm>
             <a:off x="0" y="5243040"/>
-            <a:ext cx="10077480" cy="52560"/>
+            <a:ext cx="10077120" cy="52200"/>
           </a:xfrm>
           <a:prstGeom prst="rect">
             <a:avLst/>
@@ -7310,7 +6796,7 @@
                                           </p:stCondLst>
                                         </p:cTn>
                                         <p:tgtEl>
-                                          <p:spTgt spid="136"/>
+                                          <p:spTgt spid="133"/>
                                         </p:tgtEl>
                                         <p:attrNameLst>
                                           <p:attrName>style.visibility</p:attrName>
@@ -7324,7 +6810,7 @@
                                       <p:cBhvr additive="repl">
                                         <p:cTn id="7" dur="400"/>
                                         <p:tgtEl>
-                                          <p:spTgt spid="136"/>
+                                          <p:spTgt spid="133"/>
                                         </p:tgtEl>
                                       </p:cBhvr>
                                     </p:animEffect>

</xml_diff>